<commit_message>
updating PPT with SVM
</commit_message>
<xml_diff>
--- a/[SEP592] Contest 2조(임석빈,박민우).pptx
+++ b/[SEP592] Contest 2조(임석빈,박민우).pptx
@@ -1,11 +1,11 @@
 
 <file path=ppt/presentation.xml><?xml version="1.0" encoding="utf-8"?>
-<p:presentation xmlns:a="http://schemas.openxmlformats.org/drawingml/2006/main" xmlns:r="http://schemas.openxmlformats.org/officeDocument/2006/relationships" xmlns:p="http://schemas.openxmlformats.org/presentationml/2006/main">
+<p:presentation xmlns:a="http://schemas.openxmlformats.org/drawingml/2006/main" xmlns:r="http://schemas.openxmlformats.org/officeDocument/2006/relationships" xmlns:p="http://schemas.openxmlformats.org/presentationml/2006/main" saveSubsetFonts="1">
   <p:sldMasterIdLst>
     <p:sldMasterId id="2147483648" r:id="rId1"/>
   </p:sldMasterIdLst>
   <p:notesMasterIdLst>
-    <p:notesMasterId r:id="rId10"/>
+    <p:notesMasterId r:id="rId16"/>
   </p:notesMasterIdLst>
   <p:sldIdLst>
     <p:sldId id="256" r:id="rId2"/>
@@ -16,6 +16,12 @@
     <p:sldId id="462" r:id="rId7"/>
     <p:sldId id="463" r:id="rId8"/>
     <p:sldId id="465" r:id="rId9"/>
+    <p:sldId id="469" r:id="rId10"/>
+    <p:sldId id="470" r:id="rId11"/>
+    <p:sldId id="471" r:id="rId12"/>
+    <p:sldId id="466" r:id="rId13"/>
+    <p:sldId id="468" r:id="rId14"/>
+    <p:sldId id="467" r:id="rId15"/>
   </p:sldIdLst>
   <p:sldSz cx="13004800" cy="9753600"/>
   <p:notesSz cx="6858000" cy="9144000"/>
@@ -585,660 +591,13 @@
     <a:masterClrMapping/>
   </p:clrMapOvr>
   <p:transition spd="med"/>
-</p:sldLayout>
-</file>
-
-<file path=ppt/slideLayouts/slideLayout10.xml><?xml version="1.0" encoding="utf-8"?>
-<p:sldLayout xmlns:a="http://schemas.openxmlformats.org/drawingml/2006/main" xmlns:r="http://schemas.openxmlformats.org/officeDocument/2006/relationships" xmlns:p="http://schemas.openxmlformats.org/presentationml/2006/main" type="tx">
-  <p:cSld name="Title &amp; Bullets - Left">
-    <p:bg>
-      <p:bgPr>
-        <a:blipFill rotWithShape="1">
-          <a:blip r:embed="rId2"/>
-          <a:srcRect/>
-          <a:stretch>
-            <a:fillRect/>
-          </a:stretch>
-        </a:blipFill>
-        <a:effectLst/>
-      </p:bgPr>
-    </p:bg>
-    <p:spTree>
-      <p:nvGrpSpPr>
-        <p:cNvPr id="1" name=""/>
-        <p:cNvGrpSpPr/>
-        <p:nvPr/>
-      </p:nvGrpSpPr>
-      <p:grpSpPr>
-        <a:xfrm>
-          <a:off x="0" y="0"/>
-          <a:ext cx="0" cy="0"/>
-          <a:chOff x="0" y="0"/>
-          <a:chExt cx="0" cy="0"/>
-        </a:xfrm>
-      </p:grpSpPr>
-      <p:sp>
-        <p:nvSpPr>
-          <p:cNvPr id="52" name="Shape 52"/>
-          <p:cNvSpPr>
-            <a:spLocks noGrp="1"/>
-          </p:cNvSpPr>
-          <p:nvPr>
-            <p:ph type="title"/>
-          </p:nvPr>
-        </p:nvSpPr>
-        <p:spPr>
-          <a:xfrm>
-            <a:off x="1079500" y="152400"/>
-            <a:ext cx="10845800" cy="2095500"/>
-          </a:xfrm>
-          <a:prstGeom prst="rect">
-            <a:avLst/>
-          </a:prstGeom>
-        </p:spPr>
-        <p:txBody>
-          <a:bodyPr lIns="50800" tIns="50800" rIns="50800" bIns="50800" anchor="ctr">
-            <a:noAutofit/>
-          </a:bodyPr>
-          <a:lstStyle>
-            <a:lvl1pPr algn="ctr" defTabSz="584200">
-              <a:lnSpc>
-                <a:spcPct val="100000"/>
-              </a:lnSpc>
-              <a:defRPr sz="7000">
-                <a:solidFill>
-                  <a:srgbClr val="FFFFFF"/>
-                </a:solidFill>
-                <a:latin typeface="+mn-lt"/>
-                <a:ea typeface="+mn-ea"/>
-                <a:cs typeface="+mn-cs"/>
-                <a:sym typeface="American Typewriter"/>
-              </a:defRPr>
-            </a:lvl1pPr>
-          </a:lstStyle>
-          <a:p>
-            <a:pPr lvl="0">
-              <a:defRPr sz="1800">
-                <a:solidFill>
-                  <a:srgbClr val="000000"/>
-                </a:solidFill>
-              </a:defRPr>
-            </a:pPr>
-            <a:r>
-              <a:rPr sz="7000">
-                <a:solidFill>
-                  <a:srgbClr val="FFFFFF"/>
-                </a:solidFill>
-              </a:rPr>
-              <a:t>Title Text</a:t>
-            </a:r>
-          </a:p>
-        </p:txBody>
-      </p:sp>
-      <p:sp>
-        <p:nvSpPr>
-          <p:cNvPr id="53" name="Shape 53"/>
-          <p:cNvSpPr>
-            <a:spLocks noGrp="1"/>
-          </p:cNvSpPr>
-          <p:nvPr>
-            <p:ph type="body" idx="1"/>
-          </p:nvPr>
-        </p:nvSpPr>
-        <p:spPr>
-          <a:xfrm>
-            <a:off x="1079500" y="2527300"/>
-            <a:ext cx="5232400" cy="6108700"/>
-          </a:xfrm>
-          <a:prstGeom prst="rect">
-            <a:avLst/>
-          </a:prstGeom>
-        </p:spPr>
-        <p:txBody>
-          <a:bodyPr lIns="50800" tIns="50800" rIns="50800" bIns="50800" anchor="ctr">
-            <a:noAutofit/>
-          </a:bodyPr>
-          <a:lstStyle>
-            <a:lvl1pPr marL="802738" indent="-459838" defTabSz="584200">
-              <a:spcBef>
-                <a:spcPts val="3200"/>
-              </a:spcBef>
-              <a:buSzPct val="120000"/>
-              <a:buChar char="•"/>
-              <a:defRPr sz="3200">
-                <a:solidFill>
-                  <a:srgbClr val="FFFFFF"/>
-                </a:solidFill>
-                <a:latin typeface="+mn-lt"/>
-                <a:ea typeface="+mn-ea"/>
-                <a:cs typeface="+mn-cs"/>
-                <a:sym typeface="American Typewriter"/>
-              </a:defRPr>
-            </a:lvl1pPr>
-            <a:lvl2pPr marL="1327671" indent="-459838" defTabSz="584200">
-              <a:spcBef>
-                <a:spcPts val="3200"/>
-              </a:spcBef>
-              <a:buSzPct val="120000"/>
-              <a:defRPr sz="3200">
-                <a:solidFill>
-                  <a:srgbClr val="FFFFFF"/>
-                </a:solidFill>
-                <a:latin typeface="+mn-lt"/>
-                <a:ea typeface="+mn-ea"/>
-                <a:cs typeface="+mn-cs"/>
-                <a:sym typeface="American Typewriter"/>
-              </a:defRPr>
-            </a:lvl2pPr>
-            <a:lvl3pPr marL="1835671" indent="-459838" defTabSz="584200">
-              <a:spcBef>
-                <a:spcPts val="3200"/>
-              </a:spcBef>
-              <a:buSzPct val="120000"/>
-              <a:defRPr sz="3200">
-                <a:solidFill>
-                  <a:srgbClr val="FFFFFF"/>
-                </a:solidFill>
-                <a:latin typeface="+mn-lt"/>
-                <a:ea typeface="+mn-ea"/>
-                <a:cs typeface="+mn-cs"/>
-                <a:sym typeface="American Typewriter"/>
-              </a:defRPr>
-            </a:lvl3pPr>
-            <a:lvl4pPr marL="2360605" indent="-459838" defTabSz="584200">
-              <a:spcBef>
-                <a:spcPts val="3200"/>
-              </a:spcBef>
-              <a:buSzPct val="120000"/>
-              <a:defRPr sz="3200">
-                <a:solidFill>
-                  <a:srgbClr val="FFFFFF"/>
-                </a:solidFill>
-                <a:latin typeface="+mn-lt"/>
-                <a:ea typeface="+mn-ea"/>
-                <a:cs typeface="+mn-cs"/>
-                <a:sym typeface="American Typewriter"/>
-              </a:defRPr>
-            </a:lvl4pPr>
-            <a:lvl5pPr marL="2885538" indent="-459838" defTabSz="584200">
-              <a:spcBef>
-                <a:spcPts val="3200"/>
-              </a:spcBef>
-              <a:buSzPct val="120000"/>
-              <a:defRPr sz="3200">
-                <a:solidFill>
-                  <a:srgbClr val="FFFFFF"/>
-                </a:solidFill>
-                <a:latin typeface="+mn-lt"/>
-                <a:ea typeface="+mn-ea"/>
-                <a:cs typeface="+mn-cs"/>
-                <a:sym typeface="American Typewriter"/>
-              </a:defRPr>
-            </a:lvl5pPr>
-          </a:lstStyle>
-          <a:p>
-            <a:pPr lvl="0">
-              <a:defRPr sz="1800">
-                <a:solidFill>
-                  <a:srgbClr val="000000"/>
-                </a:solidFill>
-              </a:defRPr>
-            </a:pPr>
-            <a:r>
-              <a:rPr sz="3200">
-                <a:solidFill>
-                  <a:srgbClr val="FFFFFF"/>
-                </a:solidFill>
-              </a:rPr>
-              <a:t>Body Level One</a:t>
-            </a:r>
-          </a:p>
-          <a:p>
-            <a:pPr lvl="1">
-              <a:defRPr sz="1800">
-                <a:solidFill>
-                  <a:srgbClr val="000000"/>
-                </a:solidFill>
-              </a:defRPr>
-            </a:pPr>
-            <a:r>
-              <a:rPr sz="3200">
-                <a:solidFill>
-                  <a:srgbClr val="FFFFFF"/>
-                </a:solidFill>
-              </a:rPr>
-              <a:t>Body Level Two</a:t>
-            </a:r>
-          </a:p>
-          <a:p>
-            <a:pPr lvl="2">
-              <a:defRPr sz="1800">
-                <a:solidFill>
-                  <a:srgbClr val="000000"/>
-                </a:solidFill>
-              </a:defRPr>
-            </a:pPr>
-            <a:r>
-              <a:rPr sz="3200">
-                <a:solidFill>
-                  <a:srgbClr val="FFFFFF"/>
-                </a:solidFill>
-              </a:rPr>
-              <a:t>Body Level Three</a:t>
-            </a:r>
-          </a:p>
-          <a:p>
-            <a:pPr lvl="3">
-              <a:defRPr sz="1800">
-                <a:solidFill>
-                  <a:srgbClr val="000000"/>
-                </a:solidFill>
-              </a:defRPr>
-            </a:pPr>
-            <a:r>
-              <a:rPr sz="3200">
-                <a:solidFill>
-                  <a:srgbClr val="FFFFFF"/>
-                </a:solidFill>
-              </a:rPr>
-              <a:t>Body Level Four</a:t>
-            </a:r>
-          </a:p>
-          <a:p>
-            <a:pPr lvl="4">
-              <a:defRPr sz="1800">
-                <a:solidFill>
-                  <a:srgbClr val="000000"/>
-                </a:solidFill>
-              </a:defRPr>
-            </a:pPr>
-            <a:r>
-              <a:rPr sz="3200">
-                <a:solidFill>
-                  <a:srgbClr val="FFFFFF"/>
-                </a:solidFill>
-              </a:rPr>
-              <a:t>Body Level Five</a:t>
-            </a:r>
-          </a:p>
-        </p:txBody>
-      </p:sp>
-      <p:sp>
-        <p:nvSpPr>
-          <p:cNvPr id="54" name="Shape 54"/>
-          <p:cNvSpPr>
-            <a:spLocks noGrp="1"/>
-          </p:cNvSpPr>
-          <p:nvPr>
-            <p:ph type="sldNum" sz="quarter" idx="2"/>
-          </p:nvPr>
-        </p:nvSpPr>
-        <p:spPr>
-          <a:xfrm>
-            <a:off x="6311900" y="9080500"/>
-            <a:ext cx="384506" cy="368300"/>
-          </a:xfrm>
-          <a:prstGeom prst="rect">
-            <a:avLst/>
-          </a:prstGeom>
-        </p:spPr>
-        <p:txBody>
-          <a:bodyPr wrap="none" lIns="0" tIns="0" rIns="0" bIns="0" anchor="t"/>
-          <a:lstStyle>
-            <a:lvl1pPr algn="ctr" defTabSz="584200">
-              <a:defRPr sz="1800">
-                <a:solidFill>
-                  <a:srgbClr val="FFFFFF"/>
-                </a:solidFill>
-                <a:latin typeface="+mn-lt"/>
-                <a:ea typeface="+mn-ea"/>
-                <a:cs typeface="+mn-cs"/>
-                <a:sym typeface="American Typewriter"/>
-              </a:defRPr>
-            </a:lvl1pPr>
-          </a:lstStyle>
-          <a:p>
-            <a:pPr lvl="0"/>
-            <a:fld id="{86CB4B4D-7CA3-9044-876B-883B54F8677D}" type="slidenum">
-              <a:t>‹#›</a:t>
-            </a:fld>
-            <a:endParaRPr/>
-          </a:p>
-        </p:txBody>
-      </p:sp>
-    </p:spTree>
-  </p:cSld>
-  <p:clrMapOvr>
-    <a:masterClrMapping/>
-  </p:clrMapOvr>
-  <p:transition spd="med"/>
-</p:sldLayout>
-</file>
-
-<file path=ppt/slideLayouts/slideLayout11.xml><?xml version="1.0" encoding="utf-8"?>
-<p:sldLayout xmlns:a="http://schemas.openxmlformats.org/drawingml/2006/main" xmlns:r="http://schemas.openxmlformats.org/officeDocument/2006/relationships" xmlns:p="http://schemas.openxmlformats.org/presentationml/2006/main" type="tx">
-  <p:cSld name="Title &amp; Bullets - Right">
-    <p:bg>
-      <p:bgPr>
-        <a:blipFill rotWithShape="1">
-          <a:blip r:embed="rId2"/>
-          <a:srcRect/>
-          <a:stretch>
-            <a:fillRect/>
-          </a:stretch>
-        </a:blipFill>
-        <a:effectLst/>
-      </p:bgPr>
-    </p:bg>
-    <p:spTree>
-      <p:nvGrpSpPr>
-        <p:cNvPr id="1" name=""/>
-        <p:cNvGrpSpPr/>
-        <p:nvPr/>
-      </p:nvGrpSpPr>
-      <p:grpSpPr>
-        <a:xfrm>
-          <a:off x="0" y="0"/>
-          <a:ext cx="0" cy="0"/>
-          <a:chOff x="0" y="0"/>
-          <a:chExt cx="0" cy="0"/>
-        </a:xfrm>
-      </p:grpSpPr>
-      <p:sp>
-        <p:nvSpPr>
-          <p:cNvPr id="56" name="Shape 56"/>
-          <p:cNvSpPr>
-            <a:spLocks noGrp="1"/>
-          </p:cNvSpPr>
-          <p:nvPr>
-            <p:ph type="title"/>
-          </p:nvPr>
-        </p:nvSpPr>
-        <p:spPr>
-          <a:xfrm>
-            <a:off x="1079500" y="152400"/>
-            <a:ext cx="10845800" cy="2095500"/>
-          </a:xfrm>
-          <a:prstGeom prst="rect">
-            <a:avLst/>
-          </a:prstGeom>
-        </p:spPr>
-        <p:txBody>
-          <a:bodyPr lIns="50800" tIns="50800" rIns="50800" bIns="50800" anchor="ctr">
-            <a:noAutofit/>
-          </a:bodyPr>
-          <a:lstStyle>
-            <a:lvl1pPr algn="ctr" defTabSz="584200">
-              <a:lnSpc>
-                <a:spcPct val="100000"/>
-              </a:lnSpc>
-              <a:defRPr sz="7000">
-                <a:solidFill>
-                  <a:srgbClr val="FFFFFF"/>
-                </a:solidFill>
-                <a:latin typeface="+mn-lt"/>
-                <a:ea typeface="+mn-ea"/>
-                <a:cs typeface="+mn-cs"/>
-                <a:sym typeface="American Typewriter"/>
-              </a:defRPr>
-            </a:lvl1pPr>
-          </a:lstStyle>
-          <a:p>
-            <a:pPr lvl="0">
-              <a:defRPr sz="1800">
-                <a:solidFill>
-                  <a:srgbClr val="000000"/>
-                </a:solidFill>
-              </a:defRPr>
-            </a:pPr>
-            <a:r>
-              <a:rPr sz="7000">
-                <a:solidFill>
-                  <a:srgbClr val="FFFFFF"/>
-                </a:solidFill>
-              </a:rPr>
-              <a:t>Title Text</a:t>
-            </a:r>
-          </a:p>
-        </p:txBody>
-      </p:sp>
-      <p:sp>
-        <p:nvSpPr>
-          <p:cNvPr id="57" name="Shape 57"/>
-          <p:cNvSpPr>
-            <a:spLocks noGrp="1"/>
-          </p:cNvSpPr>
-          <p:nvPr>
-            <p:ph type="body" idx="1"/>
-          </p:nvPr>
-        </p:nvSpPr>
-        <p:spPr>
-          <a:xfrm>
-            <a:off x="7772400" y="2527300"/>
-            <a:ext cx="4152900" cy="6108700"/>
-          </a:xfrm>
-          <a:prstGeom prst="rect">
-            <a:avLst/>
-          </a:prstGeom>
-        </p:spPr>
-        <p:txBody>
-          <a:bodyPr lIns="50800" tIns="50800" rIns="50800" bIns="50800" anchor="ctr">
-            <a:noAutofit/>
-          </a:bodyPr>
-          <a:lstStyle>
-            <a:lvl1pPr marL="802738" indent="-459838" defTabSz="584200">
-              <a:spcBef>
-                <a:spcPts val="3200"/>
-              </a:spcBef>
-              <a:buSzPct val="120000"/>
-              <a:buChar char="•"/>
-              <a:defRPr sz="3200">
-                <a:solidFill>
-                  <a:srgbClr val="FFFFFF"/>
-                </a:solidFill>
-                <a:latin typeface="+mn-lt"/>
-                <a:ea typeface="+mn-ea"/>
-                <a:cs typeface="+mn-cs"/>
-                <a:sym typeface="American Typewriter"/>
-              </a:defRPr>
-            </a:lvl1pPr>
-            <a:lvl2pPr marL="1327671" indent="-459838" defTabSz="584200">
-              <a:spcBef>
-                <a:spcPts val="3200"/>
-              </a:spcBef>
-              <a:buSzPct val="120000"/>
-              <a:defRPr sz="3200">
-                <a:solidFill>
-                  <a:srgbClr val="FFFFFF"/>
-                </a:solidFill>
-                <a:latin typeface="+mn-lt"/>
-                <a:ea typeface="+mn-ea"/>
-                <a:cs typeface="+mn-cs"/>
-                <a:sym typeface="American Typewriter"/>
-              </a:defRPr>
-            </a:lvl2pPr>
-            <a:lvl3pPr marL="1835671" indent="-459838" defTabSz="584200">
-              <a:spcBef>
-                <a:spcPts val="3200"/>
-              </a:spcBef>
-              <a:buSzPct val="120000"/>
-              <a:defRPr sz="3200">
-                <a:solidFill>
-                  <a:srgbClr val="FFFFFF"/>
-                </a:solidFill>
-                <a:latin typeface="+mn-lt"/>
-                <a:ea typeface="+mn-ea"/>
-                <a:cs typeface="+mn-cs"/>
-                <a:sym typeface="American Typewriter"/>
-              </a:defRPr>
-            </a:lvl3pPr>
-            <a:lvl4pPr marL="2360605" indent="-459838" defTabSz="584200">
-              <a:spcBef>
-                <a:spcPts val="3200"/>
-              </a:spcBef>
-              <a:buSzPct val="120000"/>
-              <a:defRPr sz="3200">
-                <a:solidFill>
-                  <a:srgbClr val="FFFFFF"/>
-                </a:solidFill>
-                <a:latin typeface="+mn-lt"/>
-                <a:ea typeface="+mn-ea"/>
-                <a:cs typeface="+mn-cs"/>
-                <a:sym typeface="American Typewriter"/>
-              </a:defRPr>
-            </a:lvl4pPr>
-            <a:lvl5pPr marL="2885538" indent="-459838" defTabSz="584200">
-              <a:spcBef>
-                <a:spcPts val="3200"/>
-              </a:spcBef>
-              <a:buSzPct val="120000"/>
-              <a:defRPr sz="3200">
-                <a:solidFill>
-                  <a:srgbClr val="FFFFFF"/>
-                </a:solidFill>
-                <a:latin typeface="+mn-lt"/>
-                <a:ea typeface="+mn-ea"/>
-                <a:cs typeface="+mn-cs"/>
-                <a:sym typeface="American Typewriter"/>
-              </a:defRPr>
-            </a:lvl5pPr>
-          </a:lstStyle>
-          <a:p>
-            <a:pPr lvl="0">
-              <a:defRPr sz="1800">
-                <a:solidFill>
-                  <a:srgbClr val="000000"/>
-                </a:solidFill>
-              </a:defRPr>
-            </a:pPr>
-            <a:r>
-              <a:rPr sz="3200">
-                <a:solidFill>
-                  <a:srgbClr val="FFFFFF"/>
-                </a:solidFill>
-              </a:rPr>
-              <a:t>Body Level One</a:t>
-            </a:r>
-          </a:p>
-          <a:p>
-            <a:pPr lvl="1">
-              <a:defRPr sz="1800">
-                <a:solidFill>
-                  <a:srgbClr val="000000"/>
-                </a:solidFill>
-              </a:defRPr>
-            </a:pPr>
-            <a:r>
-              <a:rPr sz="3200">
-                <a:solidFill>
-                  <a:srgbClr val="FFFFFF"/>
-                </a:solidFill>
-              </a:rPr>
-              <a:t>Body Level Two</a:t>
-            </a:r>
-          </a:p>
-          <a:p>
-            <a:pPr lvl="2">
-              <a:defRPr sz="1800">
-                <a:solidFill>
-                  <a:srgbClr val="000000"/>
-                </a:solidFill>
-              </a:defRPr>
-            </a:pPr>
-            <a:r>
-              <a:rPr sz="3200">
-                <a:solidFill>
-                  <a:srgbClr val="FFFFFF"/>
-                </a:solidFill>
-              </a:rPr>
-              <a:t>Body Level Three</a:t>
-            </a:r>
-          </a:p>
-          <a:p>
-            <a:pPr lvl="3">
-              <a:defRPr sz="1800">
-                <a:solidFill>
-                  <a:srgbClr val="000000"/>
-                </a:solidFill>
-              </a:defRPr>
-            </a:pPr>
-            <a:r>
-              <a:rPr sz="3200">
-                <a:solidFill>
-                  <a:srgbClr val="FFFFFF"/>
-                </a:solidFill>
-              </a:rPr>
-              <a:t>Body Level Four</a:t>
-            </a:r>
-          </a:p>
-          <a:p>
-            <a:pPr lvl="4">
-              <a:defRPr sz="1800">
-                <a:solidFill>
-                  <a:srgbClr val="000000"/>
-                </a:solidFill>
-              </a:defRPr>
-            </a:pPr>
-            <a:r>
-              <a:rPr sz="3200">
-                <a:solidFill>
-                  <a:srgbClr val="FFFFFF"/>
-                </a:solidFill>
-              </a:rPr>
-              <a:t>Body Level Five</a:t>
-            </a:r>
-          </a:p>
-        </p:txBody>
-      </p:sp>
-      <p:sp>
-        <p:nvSpPr>
-          <p:cNvPr id="58" name="Shape 58"/>
-          <p:cNvSpPr>
-            <a:spLocks noGrp="1"/>
-          </p:cNvSpPr>
-          <p:nvPr>
-            <p:ph type="sldNum" sz="quarter" idx="2"/>
-          </p:nvPr>
-        </p:nvSpPr>
-        <p:spPr>
-          <a:xfrm>
-            <a:off x="6311900" y="9080500"/>
-            <a:ext cx="384506" cy="368300"/>
-          </a:xfrm>
-          <a:prstGeom prst="rect">
-            <a:avLst/>
-          </a:prstGeom>
-        </p:spPr>
-        <p:txBody>
-          <a:bodyPr wrap="none" lIns="0" tIns="0" rIns="0" bIns="0" anchor="t"/>
-          <a:lstStyle>
-            <a:lvl1pPr algn="ctr" defTabSz="584200">
-              <a:defRPr sz="1800">
-                <a:solidFill>
-                  <a:srgbClr val="FFFFFF"/>
-                </a:solidFill>
-                <a:latin typeface="+mn-lt"/>
-                <a:ea typeface="+mn-ea"/>
-                <a:cs typeface="+mn-cs"/>
-                <a:sym typeface="American Typewriter"/>
-              </a:defRPr>
-            </a:lvl1pPr>
-          </a:lstStyle>
-          <a:p>
-            <a:pPr lvl="0"/>
-            <a:fld id="{86CB4B4D-7CA3-9044-876B-883B54F8677D}" type="slidenum">
-              <a:t>‹#›</a:t>
-            </a:fld>
-            <a:endParaRPr/>
-          </a:p>
-        </p:txBody>
-      </p:sp>
-    </p:spTree>
-  </p:cSld>
-  <p:clrMapOvr>
-    <a:masterClrMapping/>
-  </p:clrMapOvr>
-  <p:transition spd="med"/>
+  <p:timing>
+    <p:tnLst>
+      <p:par>
+        <p:cTn id="1" dur="indefinite" restart="never" nodeType="tmRoot"/>
+      </p:par>
+    </p:tnLst>
+  </p:timing>
 </p:sldLayout>
 </file>
 
@@ -1358,6 +717,11 @@
           <a:prstGeom prst="rect">
             <a:avLst/>
           </a:prstGeom>
+          <a:solidFill>
+            <a:schemeClr val="tx1">
+              <a:alpha val="85000"/>
+            </a:schemeClr>
+          </a:solidFill>
         </p:spPr>
         <p:txBody>
           <a:bodyPr lIns="50800" tIns="50800" rIns="50800" bIns="50800" anchor="ctr">
@@ -1571,330 +935,79 @@
           </a:p>
         </p:txBody>
       </p:sp>
-    </p:spTree>
-  </p:cSld>
-  <p:clrMapOvr>
-    <a:masterClrMapping/>
-  </p:clrMapOvr>
-  <p:transition spd="med"/>
-</p:sldLayout>
-</file>
-
-<file path=ppt/slideLayouts/slideLayout3.xml><?xml version="1.0" encoding="utf-8"?>
-<p:sldLayout xmlns:a="http://schemas.openxmlformats.org/drawingml/2006/main" xmlns:r="http://schemas.openxmlformats.org/officeDocument/2006/relationships" xmlns:p="http://schemas.openxmlformats.org/presentationml/2006/main" type="tx">
-  <p:cSld name="Title &amp; Bullets - 2 Column">
-    <p:bg>
-      <p:bgPr>
-        <a:blipFill rotWithShape="1">
-          <a:blip r:embed="rId2"/>
-          <a:srcRect/>
-          <a:stretch>
-            <a:fillRect/>
-          </a:stretch>
-        </a:blipFill>
-        <a:effectLst/>
-      </p:bgPr>
-    </p:bg>
-    <p:spTree>
-      <p:nvGrpSpPr>
-        <p:cNvPr id="1" name=""/>
-        <p:cNvGrpSpPr/>
-        <p:nvPr/>
-      </p:nvGrpSpPr>
-      <p:grpSpPr>
-        <a:xfrm>
-          <a:off x="0" y="0"/>
-          <a:ext cx="0" cy="0"/>
-          <a:chOff x="0" y="0"/>
-          <a:chExt cx="0" cy="0"/>
-        </a:xfrm>
-      </p:grpSpPr>
       <p:sp>
         <p:nvSpPr>
-          <p:cNvPr id="27" name="Shape 27"/>
-          <p:cNvSpPr>
-            <a:spLocks noGrp="1"/>
-          </p:cNvSpPr>
-          <p:nvPr>
-            <p:ph type="title"/>
-          </p:nvPr>
+          <p:cNvPr id="2" name="Rectangle 1"/>
+          <p:cNvSpPr/>
+          <p:nvPr userDrawn="1"/>
         </p:nvSpPr>
         <p:spPr>
           <a:xfrm>
-            <a:off x="1079500" y="152400"/>
-            <a:ext cx="10845800" cy="2095500"/>
+            <a:off x="731520" y="731520"/>
+            <a:ext cx="246380" cy="957580"/>
           </a:xfrm>
           <a:prstGeom prst="rect">
             <a:avLst/>
           </a:prstGeom>
+          <a:solidFill>
+            <a:schemeClr val="accent1">
+              <a:lumMod val="50000"/>
+            </a:schemeClr>
+          </a:solidFill>
+          <a:ln w="12700" cap="flat">
+            <a:noFill/>
+            <a:miter lim="400000"/>
+          </a:ln>
+          <a:effectLst/>
         </p:spPr>
+        <p:style>
+          <a:lnRef idx="0">
+            <a:scrgbClr r="0" g="0" b="0"/>
+          </a:lnRef>
+          <a:fillRef idx="0">
+            <a:scrgbClr r="0" g="0" b="0"/>
+          </a:fillRef>
+          <a:effectRef idx="0">
+            <a:scrgbClr r="0" g="0" b="0"/>
+          </a:effectRef>
+          <a:fontRef idx="none"/>
+        </p:style>
         <p:txBody>
-          <a:bodyPr lIns="50800" tIns="50800" rIns="50800" bIns="50800" anchor="ctr">
-            <a:noAutofit/>
+          <a:bodyPr rot="0" spcFirstLastPara="1" vertOverflow="overflow" horzOverflow="overflow" vert="horz" wrap="square" lIns="50800" tIns="50800" rIns="50800" bIns="50800" numCol="1" spcCol="38100" rtlCol="0" anchor="ctr">
+            <a:spAutoFit/>
           </a:bodyPr>
-          <a:lstStyle>
-            <a:lvl1pPr algn="ctr" defTabSz="584200">
+          <a:lstStyle/>
+          <a:p>
+            <a:pPr marL="0" marR="0" indent="0" algn="ctr" defTabSz="584200" rtl="0" fontAlgn="auto" latinLnBrk="1" hangingPunct="0">
               <a:lnSpc>
                 <a:spcPct val="100000"/>
               </a:lnSpc>
-              <a:defRPr sz="7000">
-                <a:solidFill>
-                  <a:srgbClr val="FFFFFF"/>
-                </a:solidFill>
-                <a:latin typeface="+mn-lt"/>
-                <a:ea typeface="+mn-ea"/>
-                <a:cs typeface="+mn-cs"/>
-                <a:sym typeface="American Typewriter"/>
-              </a:defRPr>
-            </a:lvl1pPr>
-          </a:lstStyle>
-          <a:p>
-            <a:pPr lvl="0">
-              <a:defRPr sz="1800">
-                <a:solidFill>
-                  <a:srgbClr val="000000"/>
-                </a:solidFill>
-              </a:defRPr>
+              <a:spcBef>
+                <a:spcPts val="0"/>
+              </a:spcBef>
+              <a:spcAft>
+                <a:spcPts val="0"/>
+              </a:spcAft>
+              <a:buClrTx/>
+              <a:buSzTx/>
+              <a:buFontTx/>
+              <a:buNone/>
+              <a:tabLst/>
             </a:pPr>
-            <a:r>
-              <a:rPr sz="7000">
-                <a:solidFill>
-                  <a:srgbClr val="FFFFFF"/>
-                </a:solidFill>
-              </a:rPr>
-              <a:t>Title Text</a:t>
-            </a:r>
-          </a:p>
-        </p:txBody>
-      </p:sp>
-      <p:sp>
-        <p:nvSpPr>
-          <p:cNvPr id="28" name="Shape 28"/>
-          <p:cNvSpPr>
-            <a:spLocks noGrp="1"/>
-          </p:cNvSpPr>
-          <p:nvPr>
-            <p:ph type="body" idx="1"/>
-          </p:nvPr>
-        </p:nvSpPr>
-        <p:spPr>
-          <a:xfrm>
-            <a:off x="1079500" y="2527300"/>
-            <a:ext cx="10845800" cy="6108700"/>
-          </a:xfrm>
-          <a:prstGeom prst="rect">
-            <a:avLst/>
-          </a:prstGeom>
-        </p:spPr>
-        <p:txBody>
-          <a:bodyPr lIns="0" tIns="0" rIns="0" bIns="0" numCol="2" spcCol="542290">
-            <a:noAutofit/>
-          </a:bodyPr>
-          <a:lstStyle>
-            <a:lvl1pPr marL="802738" indent="-459838" defTabSz="584200">
-              <a:spcBef>
-                <a:spcPts val="3200"/>
-              </a:spcBef>
-              <a:buSzPct val="120000"/>
-              <a:buChar char="•"/>
-              <a:defRPr sz="3200">
-                <a:solidFill>
-                  <a:srgbClr val="FFFFFF"/>
-                </a:solidFill>
-                <a:latin typeface="나눔고딕"/>
-                <a:ea typeface="나눔고딕"/>
-                <a:cs typeface="나눔고딕"/>
-                <a:sym typeface="나눔고딕"/>
-              </a:defRPr>
-            </a:lvl1pPr>
-            <a:lvl2pPr marL="1327671" indent="-459838" defTabSz="584200">
-              <a:spcBef>
-                <a:spcPts val="3200"/>
-              </a:spcBef>
-              <a:buSzPct val="120000"/>
-              <a:defRPr sz="3200">
-                <a:solidFill>
-                  <a:srgbClr val="FFFFFF"/>
-                </a:solidFill>
-                <a:latin typeface="나눔고딕"/>
-                <a:ea typeface="나눔고딕"/>
-                <a:cs typeface="나눔고딕"/>
-                <a:sym typeface="나눔고딕"/>
-              </a:defRPr>
-            </a:lvl2pPr>
-            <a:lvl3pPr marL="1835671" indent="-459838" defTabSz="584200">
-              <a:spcBef>
-                <a:spcPts val="3200"/>
-              </a:spcBef>
-              <a:buSzPct val="120000"/>
-              <a:defRPr sz="3200">
-                <a:solidFill>
-                  <a:srgbClr val="FFFFFF"/>
-                </a:solidFill>
-                <a:latin typeface="나눔고딕"/>
-                <a:ea typeface="나눔고딕"/>
-                <a:cs typeface="나눔고딕"/>
-                <a:sym typeface="나눔고딕"/>
-              </a:defRPr>
-            </a:lvl3pPr>
-            <a:lvl4pPr marL="2360605" indent="-459838" defTabSz="584200">
-              <a:spcBef>
-                <a:spcPts val="3200"/>
-              </a:spcBef>
-              <a:buSzPct val="120000"/>
-              <a:defRPr sz="3200">
-                <a:solidFill>
-                  <a:srgbClr val="FFFFFF"/>
-                </a:solidFill>
-                <a:latin typeface="나눔고딕"/>
-                <a:ea typeface="나눔고딕"/>
-                <a:cs typeface="나눔고딕"/>
-                <a:sym typeface="나눔고딕"/>
-              </a:defRPr>
-            </a:lvl4pPr>
-            <a:lvl5pPr marL="2885538" indent="-459838" defTabSz="584200">
-              <a:spcBef>
-                <a:spcPts val="3200"/>
-              </a:spcBef>
-              <a:buSzPct val="120000"/>
-              <a:defRPr sz="3200">
-                <a:solidFill>
-                  <a:srgbClr val="FFFFFF"/>
-                </a:solidFill>
-                <a:latin typeface="나눔고딕"/>
-                <a:ea typeface="나눔고딕"/>
-                <a:cs typeface="나눔고딕"/>
-                <a:sym typeface="나눔고딕"/>
-              </a:defRPr>
-            </a:lvl5pPr>
-          </a:lstStyle>
-          <a:p>
-            <a:pPr lvl="0">
-              <a:defRPr sz="1800">
-                <a:solidFill>
-                  <a:srgbClr val="000000"/>
-                </a:solidFill>
-              </a:defRPr>
-            </a:pPr>
-            <a:r>
-              <a:rPr sz="3200">
-                <a:solidFill>
-                  <a:srgbClr val="FFFFFF"/>
-                </a:solidFill>
-              </a:rPr>
-              <a:t>Body Level One</a:t>
-            </a:r>
-          </a:p>
-          <a:p>
-            <a:pPr lvl="1">
-              <a:defRPr sz="1800">
-                <a:solidFill>
-                  <a:srgbClr val="000000"/>
-                </a:solidFill>
-              </a:defRPr>
-            </a:pPr>
-            <a:r>
-              <a:rPr sz="3200">
-                <a:solidFill>
-                  <a:srgbClr val="FFFFFF"/>
-                </a:solidFill>
-              </a:rPr>
-              <a:t>Body Level Two</a:t>
-            </a:r>
-          </a:p>
-          <a:p>
-            <a:pPr lvl="2">
-              <a:defRPr sz="1800">
-                <a:solidFill>
-                  <a:srgbClr val="000000"/>
-                </a:solidFill>
-              </a:defRPr>
-            </a:pPr>
-            <a:r>
-              <a:rPr sz="3200">
-                <a:solidFill>
-                  <a:srgbClr val="FFFFFF"/>
-                </a:solidFill>
-              </a:rPr>
-              <a:t>Body Level Three</a:t>
-            </a:r>
-          </a:p>
-          <a:p>
-            <a:pPr lvl="3">
-              <a:defRPr sz="1800">
-                <a:solidFill>
-                  <a:srgbClr val="000000"/>
-                </a:solidFill>
-              </a:defRPr>
-            </a:pPr>
-            <a:r>
-              <a:rPr sz="3200">
-                <a:solidFill>
-                  <a:srgbClr val="FFFFFF"/>
-                </a:solidFill>
-              </a:rPr>
-              <a:t>Body Level Four</a:t>
-            </a:r>
-          </a:p>
-          <a:p>
-            <a:pPr lvl="4">
-              <a:defRPr sz="1800">
-                <a:solidFill>
-                  <a:srgbClr val="000000"/>
-                </a:solidFill>
-              </a:defRPr>
-            </a:pPr>
-            <a:r>
-              <a:rPr sz="3200">
-                <a:solidFill>
-                  <a:srgbClr val="FFFFFF"/>
-                </a:solidFill>
-              </a:rPr>
-              <a:t>Body Level Five</a:t>
-            </a:r>
-          </a:p>
-        </p:txBody>
-      </p:sp>
-      <p:sp>
-        <p:nvSpPr>
-          <p:cNvPr id="29" name="Shape 29"/>
-          <p:cNvSpPr>
-            <a:spLocks noGrp="1"/>
-          </p:cNvSpPr>
-          <p:nvPr>
-            <p:ph type="sldNum" sz="quarter" idx="2"/>
-          </p:nvPr>
-        </p:nvSpPr>
-        <p:spPr>
-          <a:xfrm>
-            <a:off x="6311900" y="9080500"/>
-            <a:ext cx="384506" cy="368300"/>
-          </a:xfrm>
-          <a:prstGeom prst="rect">
-            <a:avLst/>
-          </a:prstGeom>
-        </p:spPr>
-        <p:txBody>
-          <a:bodyPr wrap="none" lIns="0" tIns="0" rIns="0" bIns="0" anchor="t"/>
-          <a:lstStyle>
-            <a:lvl1pPr algn="ctr" defTabSz="584200">
-              <a:defRPr sz="1800">
-                <a:solidFill>
-                  <a:srgbClr val="FFFFFF"/>
-                </a:solidFill>
-                <a:latin typeface="+mn-lt"/>
-                <a:ea typeface="+mn-ea"/>
-                <a:cs typeface="+mn-cs"/>
-                <a:sym typeface="American Typewriter"/>
-              </a:defRPr>
-            </a:lvl1pPr>
-          </a:lstStyle>
-          <a:p>
-            <a:pPr lvl="0"/>
-            <a:fld id="{86CB4B4D-7CA3-9044-876B-883B54F8677D}" type="slidenum">
-              <a:t>‹#›</a:t>
-            </a:fld>
-            <a:endParaRPr/>
+            <a:endParaRPr kumimoji="0" lang="en-US" sz="3600" b="0" i="0" u="none" strike="noStrike" cap="none" spc="0" normalizeH="0" baseline="0">
+              <a:ln>
+                <a:noFill/>
+              </a:ln>
+              <a:solidFill>
+                <a:srgbClr val="FFFFFF"/>
+              </a:solidFill>
+              <a:effectLst/>
+              <a:uFillTx/>
+              <a:latin typeface="+mn-lt"/>
+              <a:ea typeface="+mn-ea"/>
+              <a:cs typeface="+mn-cs"/>
+              <a:sym typeface="American Typewriter"/>
+            </a:endParaRPr>
           </a:p>
         </p:txBody>
       </p:sp>
@@ -1904,1406 +1017,13 @@
     <a:masterClrMapping/>
   </p:clrMapOvr>
   <p:transition spd="med"/>
-</p:sldLayout>
-</file>
-
-<file path=ppt/slideLayouts/slideLayout4.xml><?xml version="1.0" encoding="utf-8"?>
-<p:sldLayout xmlns:a="http://schemas.openxmlformats.org/drawingml/2006/main" xmlns:r="http://schemas.openxmlformats.org/officeDocument/2006/relationships" xmlns:p="http://schemas.openxmlformats.org/presentationml/2006/main" type="tx">
-  <p:cSld name="Master #15">
-    <p:bg>
-      <p:bgPr>
-        <a:blipFill rotWithShape="1">
-          <a:blip r:embed="rId2"/>
-          <a:srcRect/>
-          <a:stretch>
-            <a:fillRect/>
-          </a:stretch>
-        </a:blipFill>
-        <a:effectLst/>
-      </p:bgPr>
-    </p:bg>
-    <p:spTree>
-      <p:nvGrpSpPr>
-        <p:cNvPr id="1" name=""/>
-        <p:cNvGrpSpPr/>
-        <p:nvPr/>
-      </p:nvGrpSpPr>
-      <p:grpSpPr>
-        <a:xfrm>
-          <a:off x="0" y="0"/>
-          <a:ext cx="0" cy="0"/>
-          <a:chOff x="0" y="0"/>
-          <a:chExt cx="0" cy="0"/>
-        </a:xfrm>
-      </p:grpSpPr>
-      <p:sp>
-        <p:nvSpPr>
-          <p:cNvPr id="31" name="Shape 31"/>
-          <p:cNvSpPr>
-            <a:spLocks noGrp="1"/>
-          </p:cNvSpPr>
-          <p:nvPr>
-            <p:ph type="title"/>
-          </p:nvPr>
-        </p:nvSpPr>
-        <p:spPr>
-          <a:xfrm>
-            <a:off x="1079500" y="152400"/>
-            <a:ext cx="10845800" cy="2095500"/>
-          </a:xfrm>
-          <a:prstGeom prst="rect">
-            <a:avLst/>
-          </a:prstGeom>
-        </p:spPr>
-        <p:txBody>
-          <a:bodyPr lIns="50800" tIns="50800" rIns="50800" bIns="50800" anchor="ctr">
-            <a:noAutofit/>
-          </a:bodyPr>
-          <a:lstStyle>
-            <a:lvl1pPr algn="ctr" defTabSz="584200">
-              <a:lnSpc>
-                <a:spcPct val="100000"/>
-              </a:lnSpc>
-              <a:defRPr sz="7000">
-                <a:solidFill>
-                  <a:srgbClr val="FFFFFF"/>
-                </a:solidFill>
-                <a:latin typeface="+mn-lt"/>
-                <a:ea typeface="+mn-ea"/>
-                <a:cs typeface="+mn-cs"/>
-                <a:sym typeface="American Typewriter"/>
-              </a:defRPr>
-            </a:lvl1pPr>
-          </a:lstStyle>
-          <a:p>
-            <a:pPr lvl="0">
-              <a:defRPr sz="1800">
-                <a:solidFill>
-                  <a:srgbClr val="000000"/>
-                </a:solidFill>
-              </a:defRPr>
-            </a:pPr>
-            <a:r>
-              <a:rPr sz="7000">
-                <a:solidFill>
-                  <a:srgbClr val="FFFFFF"/>
-                </a:solidFill>
-              </a:rPr>
-              <a:t>Title Text</a:t>
-            </a:r>
-          </a:p>
-        </p:txBody>
-      </p:sp>
-      <p:sp>
-        <p:nvSpPr>
-          <p:cNvPr id="32" name="Shape 32"/>
-          <p:cNvSpPr>
-            <a:spLocks noGrp="1"/>
-          </p:cNvSpPr>
-          <p:nvPr>
-            <p:ph type="body" idx="1"/>
-          </p:nvPr>
-        </p:nvSpPr>
-        <p:spPr>
-          <a:xfrm>
-            <a:off x="1079500" y="2527300"/>
-            <a:ext cx="10845800" cy="6108700"/>
-          </a:xfrm>
-          <a:prstGeom prst="rect">
-            <a:avLst/>
-          </a:prstGeom>
-        </p:spPr>
-        <p:txBody>
-          <a:bodyPr lIns="0" tIns="0" rIns="0" bIns="0" numCol="2" spcCol="542290">
-            <a:noAutofit/>
-          </a:bodyPr>
-          <a:lstStyle>
-            <a:lvl1pPr marL="802738" indent="-459838" defTabSz="584200">
-              <a:spcBef>
-                <a:spcPts val="3200"/>
-              </a:spcBef>
-              <a:buSzPct val="120000"/>
-              <a:buChar char="•"/>
-              <a:defRPr sz="3200">
-                <a:solidFill>
-                  <a:srgbClr val="FFFFFF"/>
-                </a:solidFill>
-                <a:latin typeface="나눔고딕"/>
-                <a:ea typeface="나눔고딕"/>
-                <a:cs typeface="나눔고딕"/>
-                <a:sym typeface="나눔고딕"/>
-              </a:defRPr>
-            </a:lvl1pPr>
-            <a:lvl2pPr marL="1327671" indent="-459838" defTabSz="584200">
-              <a:spcBef>
-                <a:spcPts val="3200"/>
-              </a:spcBef>
-              <a:buSzPct val="120000"/>
-              <a:defRPr sz="3200">
-                <a:solidFill>
-                  <a:srgbClr val="FFFFFF"/>
-                </a:solidFill>
-                <a:latin typeface="나눔고딕"/>
-                <a:ea typeface="나눔고딕"/>
-                <a:cs typeface="나눔고딕"/>
-                <a:sym typeface="나눔고딕"/>
-              </a:defRPr>
-            </a:lvl2pPr>
-            <a:lvl3pPr marL="1835671" indent="-459838" defTabSz="584200">
-              <a:spcBef>
-                <a:spcPts val="3200"/>
-              </a:spcBef>
-              <a:buSzPct val="120000"/>
-              <a:defRPr sz="3200">
-                <a:solidFill>
-                  <a:srgbClr val="FFFFFF"/>
-                </a:solidFill>
-                <a:latin typeface="나눔고딕"/>
-                <a:ea typeface="나눔고딕"/>
-                <a:cs typeface="나눔고딕"/>
-                <a:sym typeface="나눔고딕"/>
-              </a:defRPr>
-            </a:lvl3pPr>
-            <a:lvl4pPr marL="2360605" indent="-459838" defTabSz="584200">
-              <a:spcBef>
-                <a:spcPts val="3200"/>
-              </a:spcBef>
-              <a:buSzPct val="120000"/>
-              <a:defRPr sz="3200">
-                <a:solidFill>
-                  <a:srgbClr val="FFFFFF"/>
-                </a:solidFill>
-                <a:latin typeface="나눔고딕"/>
-                <a:ea typeface="나눔고딕"/>
-                <a:cs typeface="나눔고딕"/>
-                <a:sym typeface="나눔고딕"/>
-              </a:defRPr>
-            </a:lvl4pPr>
-            <a:lvl5pPr marL="2885538" indent="-459838" defTabSz="584200">
-              <a:spcBef>
-                <a:spcPts val="3200"/>
-              </a:spcBef>
-              <a:buSzPct val="120000"/>
-              <a:defRPr sz="3200">
-                <a:solidFill>
-                  <a:srgbClr val="FFFFFF"/>
-                </a:solidFill>
-                <a:latin typeface="나눔고딕"/>
-                <a:ea typeface="나눔고딕"/>
-                <a:cs typeface="나눔고딕"/>
-                <a:sym typeface="나눔고딕"/>
-              </a:defRPr>
-            </a:lvl5pPr>
-          </a:lstStyle>
-          <a:p>
-            <a:pPr lvl="0">
-              <a:defRPr sz="1800">
-                <a:solidFill>
-                  <a:srgbClr val="000000"/>
-                </a:solidFill>
-              </a:defRPr>
-            </a:pPr>
-            <a:r>
-              <a:rPr sz="3200">
-                <a:solidFill>
-                  <a:srgbClr val="FFFFFF"/>
-                </a:solidFill>
-              </a:rPr>
-              <a:t>Body Level One</a:t>
-            </a:r>
-          </a:p>
-          <a:p>
-            <a:pPr lvl="1">
-              <a:defRPr sz="1800">
-                <a:solidFill>
-                  <a:srgbClr val="000000"/>
-                </a:solidFill>
-              </a:defRPr>
-            </a:pPr>
-            <a:r>
-              <a:rPr sz="3200">
-                <a:solidFill>
-                  <a:srgbClr val="FFFFFF"/>
-                </a:solidFill>
-              </a:rPr>
-              <a:t>Body Level Two</a:t>
-            </a:r>
-          </a:p>
-          <a:p>
-            <a:pPr lvl="2">
-              <a:defRPr sz="1800">
-                <a:solidFill>
-                  <a:srgbClr val="000000"/>
-                </a:solidFill>
-              </a:defRPr>
-            </a:pPr>
-            <a:r>
-              <a:rPr sz="3200">
-                <a:solidFill>
-                  <a:srgbClr val="FFFFFF"/>
-                </a:solidFill>
-              </a:rPr>
-              <a:t>Body Level Three</a:t>
-            </a:r>
-          </a:p>
-          <a:p>
-            <a:pPr lvl="3">
-              <a:defRPr sz="1800">
-                <a:solidFill>
-                  <a:srgbClr val="000000"/>
-                </a:solidFill>
-              </a:defRPr>
-            </a:pPr>
-            <a:r>
-              <a:rPr sz="3200">
-                <a:solidFill>
-                  <a:srgbClr val="FFFFFF"/>
-                </a:solidFill>
-              </a:rPr>
-              <a:t>Body Level Four</a:t>
-            </a:r>
-          </a:p>
-          <a:p>
-            <a:pPr lvl="4">
-              <a:defRPr sz="1800">
-                <a:solidFill>
-                  <a:srgbClr val="000000"/>
-                </a:solidFill>
-              </a:defRPr>
-            </a:pPr>
-            <a:r>
-              <a:rPr sz="3200">
-                <a:solidFill>
-                  <a:srgbClr val="FFFFFF"/>
-                </a:solidFill>
-              </a:rPr>
-              <a:t>Body Level Five</a:t>
-            </a:r>
-          </a:p>
-        </p:txBody>
-      </p:sp>
-      <p:sp>
-        <p:nvSpPr>
-          <p:cNvPr id="33" name="Shape 33"/>
-          <p:cNvSpPr>
-            <a:spLocks noGrp="1"/>
-          </p:cNvSpPr>
-          <p:nvPr>
-            <p:ph type="sldNum" sz="quarter" idx="2"/>
-          </p:nvPr>
-        </p:nvSpPr>
-        <p:spPr>
-          <a:xfrm>
-            <a:off x="6311900" y="9080500"/>
-            <a:ext cx="384506" cy="368300"/>
-          </a:xfrm>
-          <a:prstGeom prst="rect">
-            <a:avLst/>
-          </a:prstGeom>
-        </p:spPr>
-        <p:txBody>
-          <a:bodyPr wrap="none" lIns="0" tIns="0" rIns="0" bIns="0" anchor="t"/>
-          <a:lstStyle>
-            <a:lvl1pPr algn="ctr" defTabSz="584200">
-              <a:defRPr sz="1800">
-                <a:solidFill>
-                  <a:srgbClr val="FFFFFF"/>
-                </a:solidFill>
-                <a:latin typeface="+mn-lt"/>
-                <a:ea typeface="+mn-ea"/>
-                <a:cs typeface="+mn-cs"/>
-                <a:sym typeface="American Typewriter"/>
-              </a:defRPr>
-            </a:lvl1pPr>
-          </a:lstStyle>
-          <a:p>
-            <a:pPr lvl="0"/>
-            <a:fld id="{86CB4B4D-7CA3-9044-876B-883B54F8677D}" type="slidenum">
-              <a:t>‹#›</a:t>
-            </a:fld>
-            <a:endParaRPr/>
-          </a:p>
-        </p:txBody>
-      </p:sp>
-    </p:spTree>
-  </p:cSld>
-  <p:clrMapOvr>
-    <a:masterClrMapping/>
-  </p:clrMapOvr>
-  <p:transition spd="med"/>
-</p:sldLayout>
-</file>
-
-<file path=ppt/slideLayouts/slideLayout5.xml><?xml version="1.0" encoding="utf-8"?>
-<p:sldLayout xmlns:a="http://schemas.openxmlformats.org/drawingml/2006/main" xmlns:r="http://schemas.openxmlformats.org/officeDocument/2006/relationships" xmlns:p="http://schemas.openxmlformats.org/presentationml/2006/main" type="tx">
-  <p:cSld name="Title - Center">
-    <p:bg>
-      <p:bgPr>
-        <a:blipFill rotWithShape="1">
-          <a:blip r:embed="rId2"/>
-          <a:srcRect/>
-          <a:stretch>
-            <a:fillRect/>
-          </a:stretch>
-        </a:blipFill>
-        <a:effectLst/>
-      </p:bgPr>
-    </p:bg>
-    <p:spTree>
-      <p:nvGrpSpPr>
-        <p:cNvPr id="1" name=""/>
-        <p:cNvGrpSpPr/>
-        <p:nvPr/>
-      </p:nvGrpSpPr>
-      <p:grpSpPr>
-        <a:xfrm>
-          <a:off x="0" y="0"/>
-          <a:ext cx="0" cy="0"/>
-          <a:chOff x="0" y="0"/>
-          <a:chExt cx="0" cy="0"/>
-        </a:xfrm>
-      </p:grpSpPr>
-      <p:sp>
-        <p:nvSpPr>
-          <p:cNvPr id="35" name="Shape 35"/>
-          <p:cNvSpPr>
-            <a:spLocks noGrp="1"/>
-          </p:cNvSpPr>
-          <p:nvPr>
-            <p:ph type="title"/>
-          </p:nvPr>
-        </p:nvSpPr>
-        <p:spPr>
-          <a:xfrm>
-            <a:off x="1079500" y="2971800"/>
-            <a:ext cx="10845800" cy="3810000"/>
-          </a:xfrm>
-          <a:prstGeom prst="rect">
-            <a:avLst/>
-          </a:prstGeom>
-        </p:spPr>
-        <p:txBody>
-          <a:bodyPr lIns="50800" tIns="50800" rIns="50800" bIns="50800" anchor="ctr">
-            <a:noAutofit/>
-          </a:bodyPr>
-          <a:lstStyle>
-            <a:lvl1pPr algn="ctr" defTabSz="584200">
-              <a:lnSpc>
-                <a:spcPct val="100000"/>
-              </a:lnSpc>
-              <a:defRPr sz="8000">
-                <a:solidFill>
-                  <a:srgbClr val="FFFFFF"/>
-                </a:solidFill>
-                <a:latin typeface="+mn-lt"/>
-                <a:ea typeface="+mn-ea"/>
-                <a:cs typeface="+mn-cs"/>
-                <a:sym typeface="American Typewriter"/>
-              </a:defRPr>
-            </a:lvl1pPr>
-          </a:lstStyle>
-          <a:p>
-            <a:pPr lvl="0">
-              <a:defRPr sz="1800">
-                <a:solidFill>
-                  <a:srgbClr val="000000"/>
-                </a:solidFill>
-              </a:defRPr>
-            </a:pPr>
-            <a:r>
-              <a:rPr sz="8000">
-                <a:solidFill>
-                  <a:srgbClr val="FFFFFF"/>
-                </a:solidFill>
-              </a:rPr>
-              <a:t>Title Text</a:t>
-            </a:r>
-          </a:p>
-        </p:txBody>
-      </p:sp>
-      <p:sp>
-        <p:nvSpPr>
-          <p:cNvPr id="36" name="Shape 36"/>
-          <p:cNvSpPr>
-            <a:spLocks noGrp="1"/>
-          </p:cNvSpPr>
-          <p:nvPr>
-            <p:ph type="sldNum" sz="quarter" idx="2"/>
-          </p:nvPr>
-        </p:nvSpPr>
-        <p:spPr>
-          <a:xfrm>
-            <a:off x="6311900" y="9080500"/>
-            <a:ext cx="384506" cy="368300"/>
-          </a:xfrm>
-          <a:prstGeom prst="rect">
-            <a:avLst/>
-          </a:prstGeom>
-        </p:spPr>
-        <p:txBody>
-          <a:bodyPr wrap="none" lIns="0" tIns="0" rIns="0" bIns="0" anchor="t"/>
-          <a:lstStyle>
-            <a:lvl1pPr algn="ctr" defTabSz="584200">
-              <a:defRPr sz="1800">
-                <a:solidFill>
-                  <a:srgbClr val="FFFFFF"/>
-                </a:solidFill>
-                <a:latin typeface="+mn-lt"/>
-                <a:ea typeface="+mn-ea"/>
-                <a:cs typeface="+mn-cs"/>
-                <a:sym typeface="American Typewriter"/>
-              </a:defRPr>
-            </a:lvl1pPr>
-          </a:lstStyle>
-          <a:p>
-            <a:pPr lvl="0"/>
-            <a:fld id="{86CB4B4D-7CA3-9044-876B-883B54F8677D}" type="slidenum">
-              <a:t>‹#›</a:t>
-            </a:fld>
-            <a:endParaRPr/>
-          </a:p>
-        </p:txBody>
-      </p:sp>
-    </p:spTree>
-  </p:cSld>
-  <p:clrMapOvr>
-    <a:masterClrMapping/>
-  </p:clrMapOvr>
-  <p:transition spd="med"/>
-</p:sldLayout>
-</file>
-
-<file path=ppt/slideLayouts/slideLayout6.xml><?xml version="1.0" encoding="utf-8"?>
-<p:sldLayout xmlns:a="http://schemas.openxmlformats.org/drawingml/2006/main" xmlns:r="http://schemas.openxmlformats.org/officeDocument/2006/relationships" xmlns:p="http://schemas.openxmlformats.org/presentationml/2006/main" type="tx">
-  <p:cSld name="Photo - Horizontal">
-    <p:bg>
-      <p:bgPr>
-        <a:blipFill rotWithShape="1">
-          <a:blip r:embed="rId2"/>
-          <a:srcRect/>
-          <a:stretch>
-            <a:fillRect/>
-          </a:stretch>
-        </a:blipFill>
-        <a:effectLst/>
-      </p:bgPr>
-    </p:bg>
-    <p:spTree>
-      <p:nvGrpSpPr>
-        <p:cNvPr id="1" name=""/>
-        <p:cNvGrpSpPr/>
-        <p:nvPr/>
-      </p:nvGrpSpPr>
-      <p:grpSpPr>
-        <a:xfrm>
-          <a:off x="0" y="0"/>
-          <a:ext cx="0" cy="0"/>
-          <a:chOff x="0" y="0"/>
-          <a:chExt cx="0" cy="0"/>
-        </a:xfrm>
-      </p:grpSpPr>
-      <p:sp>
-        <p:nvSpPr>
-          <p:cNvPr id="38" name="Shape 38"/>
-          <p:cNvSpPr>
-            <a:spLocks noGrp="1"/>
-          </p:cNvSpPr>
-          <p:nvPr>
-            <p:ph type="title"/>
-          </p:nvPr>
-        </p:nvSpPr>
-        <p:spPr>
-          <a:xfrm>
-            <a:off x="1079500" y="7480300"/>
-            <a:ext cx="10845800" cy="1460500"/>
-          </a:xfrm>
-          <a:prstGeom prst="rect">
-            <a:avLst/>
-          </a:prstGeom>
-        </p:spPr>
-        <p:txBody>
-          <a:bodyPr lIns="50800" tIns="50800" rIns="50800" bIns="50800" anchor="ctr">
-            <a:noAutofit/>
-          </a:bodyPr>
-          <a:lstStyle>
-            <a:lvl1pPr algn="ctr" defTabSz="584200">
-              <a:lnSpc>
-                <a:spcPct val="100000"/>
-              </a:lnSpc>
-              <a:defRPr sz="8000">
-                <a:solidFill>
-                  <a:srgbClr val="FFFFFF"/>
-                </a:solidFill>
-                <a:latin typeface="+mn-lt"/>
-                <a:ea typeface="+mn-ea"/>
-                <a:cs typeface="+mn-cs"/>
-                <a:sym typeface="American Typewriter"/>
-              </a:defRPr>
-            </a:lvl1pPr>
-          </a:lstStyle>
-          <a:p>
-            <a:pPr lvl="0">
-              <a:defRPr sz="1800">
-                <a:solidFill>
-                  <a:srgbClr val="000000"/>
-                </a:solidFill>
-              </a:defRPr>
-            </a:pPr>
-            <a:r>
-              <a:rPr sz="8000">
-                <a:solidFill>
-                  <a:srgbClr val="FFFFFF"/>
-                </a:solidFill>
-              </a:rPr>
-              <a:t>Title Text</a:t>
-            </a:r>
-          </a:p>
-        </p:txBody>
-      </p:sp>
-      <p:sp>
-        <p:nvSpPr>
-          <p:cNvPr id="39" name="Shape 39"/>
-          <p:cNvSpPr>
-            <a:spLocks noGrp="1"/>
-          </p:cNvSpPr>
-          <p:nvPr>
-            <p:ph type="sldNum" sz="quarter" idx="2"/>
-          </p:nvPr>
-        </p:nvSpPr>
-        <p:spPr>
-          <a:xfrm>
-            <a:off x="6311900" y="9080500"/>
-            <a:ext cx="384506" cy="368300"/>
-          </a:xfrm>
-          <a:prstGeom prst="rect">
-            <a:avLst/>
-          </a:prstGeom>
-        </p:spPr>
-        <p:txBody>
-          <a:bodyPr wrap="none" lIns="0" tIns="0" rIns="0" bIns="0" anchor="t"/>
-          <a:lstStyle>
-            <a:lvl1pPr algn="ctr" defTabSz="584200">
-              <a:defRPr sz="1800">
-                <a:solidFill>
-                  <a:srgbClr val="FFFFFF"/>
-                </a:solidFill>
-                <a:latin typeface="+mn-lt"/>
-                <a:ea typeface="+mn-ea"/>
-                <a:cs typeface="+mn-cs"/>
-                <a:sym typeface="American Typewriter"/>
-              </a:defRPr>
-            </a:lvl1pPr>
-          </a:lstStyle>
-          <a:p>
-            <a:pPr lvl="0"/>
-            <a:fld id="{86CB4B4D-7CA3-9044-876B-883B54F8677D}" type="slidenum">
-              <a:t>‹#›</a:t>
-            </a:fld>
-            <a:endParaRPr/>
-          </a:p>
-        </p:txBody>
-      </p:sp>
-    </p:spTree>
-  </p:cSld>
-  <p:clrMapOvr>
-    <a:masterClrMapping/>
-  </p:clrMapOvr>
-  <p:transition spd="med"/>
-</p:sldLayout>
-</file>
-
-<file path=ppt/slideLayouts/slideLayout7.xml><?xml version="1.0" encoding="utf-8"?>
-<p:sldLayout xmlns:a="http://schemas.openxmlformats.org/drawingml/2006/main" xmlns:r="http://schemas.openxmlformats.org/officeDocument/2006/relationships" xmlns:p="http://schemas.openxmlformats.org/presentationml/2006/main" type="tx">
-  <p:cSld name="Photo - 6 Up">
-    <p:bg>
-      <p:bgPr>
-        <a:blipFill rotWithShape="1">
-          <a:blip r:embed="rId2"/>
-          <a:srcRect/>
-          <a:stretch>
-            <a:fillRect/>
-          </a:stretch>
-        </a:blipFill>
-        <a:effectLst/>
-      </p:bgPr>
-    </p:bg>
-    <p:spTree>
-      <p:nvGrpSpPr>
-        <p:cNvPr id="1" name=""/>
-        <p:cNvGrpSpPr/>
-        <p:nvPr/>
-      </p:nvGrpSpPr>
-      <p:grpSpPr>
-        <a:xfrm>
-          <a:off x="0" y="0"/>
-          <a:ext cx="0" cy="0"/>
-          <a:chOff x="0" y="0"/>
-          <a:chExt cx="0" cy="0"/>
-        </a:xfrm>
-      </p:grpSpPr>
-      <p:sp>
-        <p:nvSpPr>
-          <p:cNvPr id="41" name="Shape 41"/>
-          <p:cNvSpPr>
-            <a:spLocks noGrp="1"/>
-          </p:cNvSpPr>
-          <p:nvPr>
-            <p:ph type="title"/>
-          </p:nvPr>
-        </p:nvSpPr>
-        <p:spPr>
-          <a:xfrm>
-            <a:off x="1079500" y="7480300"/>
-            <a:ext cx="10845800" cy="1460500"/>
-          </a:xfrm>
-          <a:prstGeom prst="rect">
-            <a:avLst/>
-          </a:prstGeom>
-        </p:spPr>
-        <p:txBody>
-          <a:bodyPr lIns="50800" tIns="50800" rIns="50800" bIns="50800" anchor="ctr">
-            <a:noAutofit/>
-          </a:bodyPr>
-          <a:lstStyle>
-            <a:lvl1pPr algn="ctr" defTabSz="584200">
-              <a:lnSpc>
-                <a:spcPct val="100000"/>
-              </a:lnSpc>
-              <a:defRPr sz="8000">
-                <a:solidFill>
-                  <a:srgbClr val="FFFFFF"/>
-                </a:solidFill>
-                <a:latin typeface="+mn-lt"/>
-                <a:ea typeface="+mn-ea"/>
-                <a:cs typeface="+mn-cs"/>
-                <a:sym typeface="American Typewriter"/>
-              </a:defRPr>
-            </a:lvl1pPr>
-          </a:lstStyle>
-          <a:p>
-            <a:pPr lvl="0">
-              <a:defRPr sz="1800">
-                <a:solidFill>
-                  <a:srgbClr val="000000"/>
-                </a:solidFill>
-              </a:defRPr>
-            </a:pPr>
-            <a:r>
-              <a:rPr sz="8000">
-                <a:solidFill>
-                  <a:srgbClr val="FFFFFF"/>
-                </a:solidFill>
-              </a:rPr>
-              <a:t>Title Text</a:t>
-            </a:r>
-          </a:p>
-        </p:txBody>
-      </p:sp>
-      <p:sp>
-        <p:nvSpPr>
-          <p:cNvPr id="42" name="Shape 42"/>
-          <p:cNvSpPr>
-            <a:spLocks noGrp="1"/>
-          </p:cNvSpPr>
-          <p:nvPr>
-            <p:ph type="sldNum" sz="quarter" idx="2"/>
-          </p:nvPr>
-        </p:nvSpPr>
-        <p:spPr>
-          <a:xfrm>
-            <a:off x="6311900" y="9080500"/>
-            <a:ext cx="384506" cy="368300"/>
-          </a:xfrm>
-          <a:prstGeom prst="rect">
-            <a:avLst/>
-          </a:prstGeom>
-        </p:spPr>
-        <p:txBody>
-          <a:bodyPr wrap="none" lIns="0" tIns="0" rIns="0" bIns="0" anchor="t"/>
-          <a:lstStyle>
-            <a:lvl1pPr algn="ctr" defTabSz="584200">
-              <a:defRPr sz="1800">
-                <a:solidFill>
-                  <a:srgbClr val="FFFFFF"/>
-                </a:solidFill>
-                <a:latin typeface="+mn-lt"/>
-                <a:ea typeface="+mn-ea"/>
-                <a:cs typeface="+mn-cs"/>
-                <a:sym typeface="American Typewriter"/>
-              </a:defRPr>
-            </a:lvl1pPr>
-          </a:lstStyle>
-          <a:p>
-            <a:pPr lvl="0"/>
-            <a:fld id="{86CB4B4D-7CA3-9044-876B-883B54F8677D}" type="slidenum">
-              <a:t>‹#›</a:t>
-            </a:fld>
-            <a:endParaRPr/>
-          </a:p>
-        </p:txBody>
-      </p:sp>
-    </p:spTree>
-  </p:cSld>
-  <p:clrMapOvr>
-    <a:masterClrMapping/>
-  </p:clrMapOvr>
-  <p:transition spd="med"/>
-</p:sldLayout>
-</file>
-
-<file path=ppt/slideLayouts/slideLayout8.xml><?xml version="1.0" encoding="utf-8"?>
-<p:sldLayout xmlns:a="http://schemas.openxmlformats.org/drawingml/2006/main" xmlns:r="http://schemas.openxmlformats.org/officeDocument/2006/relationships" xmlns:p="http://schemas.openxmlformats.org/presentationml/2006/main" type="tx">
-  <p:cSld name="Photo - Vertical">
-    <p:bg>
-      <p:bgPr>
-        <a:blipFill rotWithShape="1">
-          <a:blip r:embed="rId2"/>
-          <a:srcRect/>
-          <a:stretch>
-            <a:fillRect/>
-          </a:stretch>
-        </a:blipFill>
-        <a:effectLst/>
-      </p:bgPr>
-    </p:bg>
-    <p:spTree>
-      <p:nvGrpSpPr>
-        <p:cNvPr id="1" name=""/>
-        <p:cNvGrpSpPr/>
-        <p:nvPr/>
-      </p:nvGrpSpPr>
-      <p:grpSpPr>
-        <a:xfrm>
-          <a:off x="0" y="0"/>
-          <a:ext cx="0" cy="0"/>
-          <a:chOff x="0" y="0"/>
-          <a:chExt cx="0" cy="0"/>
-        </a:xfrm>
-      </p:grpSpPr>
-      <p:sp>
-        <p:nvSpPr>
-          <p:cNvPr id="44" name="Shape 44"/>
-          <p:cNvSpPr>
-            <a:spLocks noGrp="1"/>
-          </p:cNvSpPr>
-          <p:nvPr>
-            <p:ph type="title"/>
-          </p:nvPr>
-        </p:nvSpPr>
-        <p:spPr>
-          <a:xfrm>
-            <a:off x="495300" y="1663700"/>
-            <a:ext cx="5651500" cy="3302000"/>
-          </a:xfrm>
-          <a:prstGeom prst="rect">
-            <a:avLst/>
-          </a:prstGeom>
-        </p:spPr>
-        <p:txBody>
-          <a:bodyPr lIns="0" tIns="0" rIns="0" bIns="0" anchor="b">
-            <a:noAutofit/>
-          </a:bodyPr>
-          <a:lstStyle>
-            <a:lvl1pPr algn="ctr" defTabSz="584200">
-              <a:lnSpc>
-                <a:spcPct val="100000"/>
-              </a:lnSpc>
-              <a:defRPr sz="7000">
-                <a:solidFill>
-                  <a:srgbClr val="FFFFFF"/>
-                </a:solidFill>
-                <a:latin typeface="+mn-lt"/>
-                <a:ea typeface="+mn-ea"/>
-                <a:cs typeface="+mn-cs"/>
-                <a:sym typeface="American Typewriter"/>
-              </a:defRPr>
-            </a:lvl1pPr>
-          </a:lstStyle>
-          <a:p>
-            <a:pPr lvl="0">
-              <a:defRPr sz="1800">
-                <a:solidFill>
-                  <a:srgbClr val="000000"/>
-                </a:solidFill>
-              </a:defRPr>
-            </a:pPr>
-            <a:r>
-              <a:rPr sz="7000">
-                <a:solidFill>
-                  <a:srgbClr val="FFFFFF"/>
-                </a:solidFill>
-              </a:rPr>
-              <a:t>Title Text</a:t>
-            </a:r>
-          </a:p>
-        </p:txBody>
-      </p:sp>
-      <p:sp>
-        <p:nvSpPr>
-          <p:cNvPr id="45" name="Shape 45"/>
-          <p:cNvSpPr>
-            <a:spLocks noGrp="1"/>
-          </p:cNvSpPr>
-          <p:nvPr>
-            <p:ph type="body" idx="1"/>
-          </p:nvPr>
-        </p:nvSpPr>
-        <p:spPr>
-          <a:xfrm>
-            <a:off x="495300" y="4991100"/>
-            <a:ext cx="5651500" cy="3073400"/>
-          </a:xfrm>
-          <a:prstGeom prst="rect">
-            <a:avLst/>
-          </a:prstGeom>
-        </p:spPr>
-        <p:txBody>
-          <a:bodyPr lIns="0" tIns="0" rIns="0" bIns="0">
-            <a:noAutofit/>
-          </a:bodyPr>
-          <a:lstStyle>
-            <a:lvl1pPr algn="ctr" defTabSz="584200">
-              <a:spcBef>
-                <a:spcPts val="0"/>
-              </a:spcBef>
-              <a:defRPr sz="5000">
-                <a:solidFill>
-                  <a:srgbClr val="909696"/>
-                </a:solidFill>
-                <a:latin typeface="+mn-lt"/>
-                <a:ea typeface="+mn-ea"/>
-                <a:cs typeface="+mn-cs"/>
-                <a:sym typeface="American Typewriter"/>
-              </a:defRPr>
-            </a:lvl1pPr>
-            <a:lvl2pPr marL="0" indent="0" algn="ctr" defTabSz="584200">
-              <a:spcBef>
-                <a:spcPts val="0"/>
-              </a:spcBef>
-              <a:buSzTx/>
-              <a:buNone/>
-              <a:defRPr sz="5000">
-                <a:solidFill>
-                  <a:srgbClr val="909696"/>
-                </a:solidFill>
-                <a:latin typeface="+mn-lt"/>
-                <a:ea typeface="+mn-ea"/>
-                <a:cs typeface="+mn-cs"/>
-                <a:sym typeface="American Typewriter"/>
-              </a:defRPr>
-            </a:lvl2pPr>
-            <a:lvl3pPr marL="0" indent="0" algn="ctr" defTabSz="584200">
-              <a:spcBef>
-                <a:spcPts val="0"/>
-              </a:spcBef>
-              <a:buSzTx/>
-              <a:buNone/>
-              <a:defRPr sz="5000">
-                <a:solidFill>
-                  <a:srgbClr val="909696"/>
-                </a:solidFill>
-                <a:latin typeface="+mn-lt"/>
-                <a:ea typeface="+mn-ea"/>
-                <a:cs typeface="+mn-cs"/>
-                <a:sym typeface="American Typewriter"/>
-              </a:defRPr>
-            </a:lvl3pPr>
-            <a:lvl4pPr marL="0" indent="0" algn="ctr" defTabSz="584200">
-              <a:spcBef>
-                <a:spcPts val="0"/>
-              </a:spcBef>
-              <a:buSzTx/>
-              <a:buNone/>
-              <a:defRPr sz="5000">
-                <a:solidFill>
-                  <a:srgbClr val="909696"/>
-                </a:solidFill>
-                <a:latin typeface="+mn-lt"/>
-                <a:ea typeface="+mn-ea"/>
-                <a:cs typeface="+mn-cs"/>
-                <a:sym typeface="American Typewriter"/>
-              </a:defRPr>
-            </a:lvl4pPr>
-            <a:lvl5pPr marL="0" indent="0" algn="ctr" defTabSz="584200">
-              <a:spcBef>
-                <a:spcPts val="0"/>
-              </a:spcBef>
-              <a:buSzTx/>
-              <a:buNone/>
-              <a:defRPr sz="5000">
-                <a:solidFill>
-                  <a:srgbClr val="909696"/>
-                </a:solidFill>
-                <a:latin typeface="+mn-lt"/>
-                <a:ea typeface="+mn-ea"/>
-                <a:cs typeface="+mn-cs"/>
-                <a:sym typeface="American Typewriter"/>
-              </a:defRPr>
-            </a:lvl5pPr>
-          </a:lstStyle>
-          <a:p>
-            <a:pPr lvl="0">
-              <a:defRPr sz="1800">
-                <a:solidFill>
-                  <a:srgbClr val="000000"/>
-                </a:solidFill>
-              </a:defRPr>
-            </a:pPr>
-            <a:r>
-              <a:rPr sz="5000">
-                <a:solidFill>
-                  <a:srgbClr val="909696"/>
-                </a:solidFill>
-              </a:rPr>
-              <a:t>Body Level One</a:t>
-            </a:r>
-          </a:p>
-          <a:p>
-            <a:pPr lvl="1">
-              <a:defRPr sz="1800">
-                <a:solidFill>
-                  <a:srgbClr val="000000"/>
-                </a:solidFill>
-              </a:defRPr>
-            </a:pPr>
-            <a:r>
-              <a:rPr sz="5000">
-                <a:solidFill>
-                  <a:srgbClr val="909696"/>
-                </a:solidFill>
-              </a:rPr>
-              <a:t>Body Level Two</a:t>
-            </a:r>
-          </a:p>
-          <a:p>
-            <a:pPr lvl="2">
-              <a:defRPr sz="1800">
-                <a:solidFill>
-                  <a:srgbClr val="000000"/>
-                </a:solidFill>
-              </a:defRPr>
-            </a:pPr>
-            <a:r>
-              <a:rPr sz="5000">
-                <a:solidFill>
-                  <a:srgbClr val="909696"/>
-                </a:solidFill>
-              </a:rPr>
-              <a:t>Body Level Three</a:t>
-            </a:r>
-          </a:p>
-          <a:p>
-            <a:pPr lvl="3">
-              <a:defRPr sz="1800">
-                <a:solidFill>
-                  <a:srgbClr val="000000"/>
-                </a:solidFill>
-              </a:defRPr>
-            </a:pPr>
-            <a:r>
-              <a:rPr sz="5000">
-                <a:solidFill>
-                  <a:srgbClr val="909696"/>
-                </a:solidFill>
-              </a:rPr>
-              <a:t>Body Level Four</a:t>
-            </a:r>
-          </a:p>
-          <a:p>
-            <a:pPr lvl="4">
-              <a:defRPr sz="1800">
-                <a:solidFill>
-                  <a:srgbClr val="000000"/>
-                </a:solidFill>
-              </a:defRPr>
-            </a:pPr>
-            <a:r>
-              <a:rPr sz="5000">
-                <a:solidFill>
-                  <a:srgbClr val="909696"/>
-                </a:solidFill>
-              </a:rPr>
-              <a:t>Body Level Five</a:t>
-            </a:r>
-          </a:p>
-        </p:txBody>
-      </p:sp>
-      <p:sp>
-        <p:nvSpPr>
-          <p:cNvPr id="46" name="Shape 46"/>
-          <p:cNvSpPr>
-            <a:spLocks noGrp="1"/>
-          </p:cNvSpPr>
-          <p:nvPr>
-            <p:ph type="sldNum" sz="quarter" idx="2"/>
-          </p:nvPr>
-        </p:nvSpPr>
-        <p:spPr>
-          <a:xfrm>
-            <a:off x="6311900" y="9080500"/>
-            <a:ext cx="384506" cy="368300"/>
-          </a:xfrm>
-          <a:prstGeom prst="rect">
-            <a:avLst/>
-          </a:prstGeom>
-        </p:spPr>
-        <p:txBody>
-          <a:bodyPr wrap="none" lIns="0" tIns="0" rIns="0" bIns="0" anchor="t"/>
-          <a:lstStyle>
-            <a:lvl1pPr algn="ctr" defTabSz="584200">
-              <a:defRPr sz="1800">
-                <a:solidFill>
-                  <a:srgbClr val="FFFFFF"/>
-                </a:solidFill>
-                <a:latin typeface="+mn-lt"/>
-                <a:ea typeface="+mn-ea"/>
-                <a:cs typeface="+mn-cs"/>
-                <a:sym typeface="American Typewriter"/>
-              </a:defRPr>
-            </a:lvl1pPr>
-          </a:lstStyle>
-          <a:p>
-            <a:pPr lvl="0"/>
-            <a:fld id="{86CB4B4D-7CA3-9044-876B-883B54F8677D}" type="slidenum">
-              <a:t>‹#›</a:t>
-            </a:fld>
-            <a:endParaRPr/>
-          </a:p>
-        </p:txBody>
-      </p:sp>
-    </p:spTree>
-  </p:cSld>
-  <p:clrMapOvr>
-    <a:masterClrMapping/>
-  </p:clrMapOvr>
-  <p:transition spd="med"/>
-</p:sldLayout>
-</file>
-
-<file path=ppt/slideLayouts/slideLayout9.xml><?xml version="1.0" encoding="utf-8"?>
-<p:sldLayout xmlns:a="http://schemas.openxmlformats.org/drawingml/2006/main" xmlns:r="http://schemas.openxmlformats.org/officeDocument/2006/relationships" xmlns:p="http://schemas.openxmlformats.org/presentationml/2006/main" type="tx">
-  <p:cSld name="Title, Bullets &amp; Photo">
-    <p:bg>
-      <p:bgPr>
-        <a:blipFill rotWithShape="1">
-          <a:blip r:embed="rId2"/>
-          <a:srcRect/>
-          <a:stretch>
-            <a:fillRect/>
-          </a:stretch>
-        </a:blipFill>
-        <a:effectLst/>
-      </p:bgPr>
-    </p:bg>
-    <p:spTree>
-      <p:nvGrpSpPr>
-        <p:cNvPr id="1" name=""/>
-        <p:cNvGrpSpPr/>
-        <p:nvPr/>
-      </p:nvGrpSpPr>
-      <p:grpSpPr>
-        <a:xfrm>
-          <a:off x="0" y="0"/>
-          <a:ext cx="0" cy="0"/>
-          <a:chOff x="0" y="0"/>
-          <a:chExt cx="0" cy="0"/>
-        </a:xfrm>
-      </p:grpSpPr>
-      <p:sp>
-        <p:nvSpPr>
-          <p:cNvPr id="48" name="Shape 48"/>
-          <p:cNvSpPr>
-            <a:spLocks noGrp="1"/>
-          </p:cNvSpPr>
-          <p:nvPr>
-            <p:ph type="title"/>
-          </p:nvPr>
-        </p:nvSpPr>
-        <p:spPr>
-          <a:xfrm>
-            <a:off x="1079500" y="152400"/>
-            <a:ext cx="10845800" cy="2095500"/>
-          </a:xfrm>
-          <a:prstGeom prst="rect">
-            <a:avLst/>
-          </a:prstGeom>
-        </p:spPr>
-        <p:txBody>
-          <a:bodyPr lIns="50800" tIns="50800" rIns="50800" bIns="50800" anchor="ctr">
-            <a:noAutofit/>
-          </a:bodyPr>
-          <a:lstStyle>
-            <a:lvl1pPr algn="ctr" defTabSz="584200">
-              <a:lnSpc>
-                <a:spcPct val="100000"/>
-              </a:lnSpc>
-              <a:defRPr sz="7000">
-                <a:solidFill>
-                  <a:srgbClr val="FFFFFF"/>
-                </a:solidFill>
-                <a:latin typeface="+mn-lt"/>
-                <a:ea typeface="+mn-ea"/>
-                <a:cs typeface="+mn-cs"/>
-                <a:sym typeface="American Typewriter"/>
-              </a:defRPr>
-            </a:lvl1pPr>
-          </a:lstStyle>
-          <a:p>
-            <a:pPr lvl="0">
-              <a:defRPr sz="1800">
-                <a:solidFill>
-                  <a:srgbClr val="000000"/>
-                </a:solidFill>
-              </a:defRPr>
-            </a:pPr>
-            <a:r>
-              <a:rPr sz="7000">
-                <a:solidFill>
-                  <a:srgbClr val="FFFFFF"/>
-                </a:solidFill>
-              </a:rPr>
-              <a:t>Title Text</a:t>
-            </a:r>
-          </a:p>
-        </p:txBody>
-      </p:sp>
-      <p:sp>
-        <p:nvSpPr>
-          <p:cNvPr id="49" name="Shape 49"/>
-          <p:cNvSpPr>
-            <a:spLocks noGrp="1"/>
-          </p:cNvSpPr>
-          <p:nvPr>
-            <p:ph type="body" idx="1"/>
-          </p:nvPr>
-        </p:nvSpPr>
-        <p:spPr>
-          <a:xfrm>
-            <a:off x="1079500" y="2527300"/>
-            <a:ext cx="5232400" cy="6108700"/>
-          </a:xfrm>
-          <a:prstGeom prst="rect">
-            <a:avLst/>
-          </a:prstGeom>
-        </p:spPr>
-        <p:txBody>
-          <a:bodyPr lIns="50800" tIns="50800" rIns="50800" bIns="50800" anchor="ctr">
-            <a:noAutofit/>
-          </a:bodyPr>
-          <a:lstStyle>
-            <a:lvl1pPr marL="802738" indent="-459838" defTabSz="584200">
-              <a:spcBef>
-                <a:spcPts val="3200"/>
-              </a:spcBef>
-              <a:buSzPct val="120000"/>
-              <a:buChar char="•"/>
-              <a:defRPr sz="3200">
-                <a:solidFill>
-                  <a:srgbClr val="FFFFFF"/>
-                </a:solidFill>
-                <a:latin typeface="+mn-lt"/>
-                <a:ea typeface="+mn-ea"/>
-                <a:cs typeface="+mn-cs"/>
-                <a:sym typeface="American Typewriter"/>
-              </a:defRPr>
-            </a:lvl1pPr>
-            <a:lvl2pPr marL="1327671" indent="-459838" defTabSz="584200">
-              <a:spcBef>
-                <a:spcPts val="3200"/>
-              </a:spcBef>
-              <a:buSzPct val="120000"/>
-              <a:defRPr sz="3200">
-                <a:solidFill>
-                  <a:srgbClr val="FFFFFF"/>
-                </a:solidFill>
-                <a:latin typeface="+mn-lt"/>
-                <a:ea typeface="+mn-ea"/>
-                <a:cs typeface="+mn-cs"/>
-                <a:sym typeface="American Typewriter"/>
-              </a:defRPr>
-            </a:lvl2pPr>
-            <a:lvl3pPr marL="1835671" indent="-459838" defTabSz="584200">
-              <a:spcBef>
-                <a:spcPts val="3200"/>
-              </a:spcBef>
-              <a:buSzPct val="120000"/>
-              <a:defRPr sz="3200">
-                <a:solidFill>
-                  <a:srgbClr val="FFFFFF"/>
-                </a:solidFill>
-                <a:latin typeface="+mn-lt"/>
-                <a:ea typeface="+mn-ea"/>
-                <a:cs typeface="+mn-cs"/>
-                <a:sym typeface="American Typewriter"/>
-              </a:defRPr>
-            </a:lvl3pPr>
-            <a:lvl4pPr marL="2360605" indent="-459838" defTabSz="584200">
-              <a:spcBef>
-                <a:spcPts val="3200"/>
-              </a:spcBef>
-              <a:buSzPct val="120000"/>
-              <a:defRPr sz="3200">
-                <a:solidFill>
-                  <a:srgbClr val="FFFFFF"/>
-                </a:solidFill>
-                <a:latin typeface="+mn-lt"/>
-                <a:ea typeface="+mn-ea"/>
-                <a:cs typeface="+mn-cs"/>
-                <a:sym typeface="American Typewriter"/>
-              </a:defRPr>
-            </a:lvl4pPr>
-            <a:lvl5pPr marL="2885538" indent="-459838" defTabSz="584200">
-              <a:spcBef>
-                <a:spcPts val="3200"/>
-              </a:spcBef>
-              <a:buSzPct val="120000"/>
-              <a:defRPr sz="3200">
-                <a:solidFill>
-                  <a:srgbClr val="FFFFFF"/>
-                </a:solidFill>
-                <a:latin typeface="+mn-lt"/>
-                <a:ea typeface="+mn-ea"/>
-                <a:cs typeface="+mn-cs"/>
-                <a:sym typeface="American Typewriter"/>
-              </a:defRPr>
-            </a:lvl5pPr>
-          </a:lstStyle>
-          <a:p>
-            <a:pPr lvl="0">
-              <a:defRPr sz="1800">
-                <a:solidFill>
-                  <a:srgbClr val="000000"/>
-                </a:solidFill>
-              </a:defRPr>
-            </a:pPr>
-            <a:r>
-              <a:rPr sz="3200">
-                <a:solidFill>
-                  <a:srgbClr val="FFFFFF"/>
-                </a:solidFill>
-              </a:rPr>
-              <a:t>Body Level One</a:t>
-            </a:r>
-          </a:p>
-          <a:p>
-            <a:pPr lvl="1">
-              <a:defRPr sz="1800">
-                <a:solidFill>
-                  <a:srgbClr val="000000"/>
-                </a:solidFill>
-              </a:defRPr>
-            </a:pPr>
-            <a:r>
-              <a:rPr sz="3200">
-                <a:solidFill>
-                  <a:srgbClr val="FFFFFF"/>
-                </a:solidFill>
-              </a:rPr>
-              <a:t>Body Level Two</a:t>
-            </a:r>
-          </a:p>
-          <a:p>
-            <a:pPr lvl="2">
-              <a:defRPr sz="1800">
-                <a:solidFill>
-                  <a:srgbClr val="000000"/>
-                </a:solidFill>
-              </a:defRPr>
-            </a:pPr>
-            <a:r>
-              <a:rPr sz="3200">
-                <a:solidFill>
-                  <a:srgbClr val="FFFFFF"/>
-                </a:solidFill>
-              </a:rPr>
-              <a:t>Body Level Three</a:t>
-            </a:r>
-          </a:p>
-          <a:p>
-            <a:pPr lvl="3">
-              <a:defRPr sz="1800">
-                <a:solidFill>
-                  <a:srgbClr val="000000"/>
-                </a:solidFill>
-              </a:defRPr>
-            </a:pPr>
-            <a:r>
-              <a:rPr sz="3200">
-                <a:solidFill>
-                  <a:srgbClr val="FFFFFF"/>
-                </a:solidFill>
-              </a:rPr>
-              <a:t>Body Level Four</a:t>
-            </a:r>
-          </a:p>
-          <a:p>
-            <a:pPr lvl="4">
-              <a:defRPr sz="1800">
-                <a:solidFill>
-                  <a:srgbClr val="000000"/>
-                </a:solidFill>
-              </a:defRPr>
-            </a:pPr>
-            <a:r>
-              <a:rPr sz="3200">
-                <a:solidFill>
-                  <a:srgbClr val="FFFFFF"/>
-                </a:solidFill>
-              </a:rPr>
-              <a:t>Body Level Five</a:t>
-            </a:r>
-          </a:p>
-        </p:txBody>
-      </p:sp>
-      <p:sp>
-        <p:nvSpPr>
-          <p:cNvPr id="50" name="Shape 50"/>
-          <p:cNvSpPr>
-            <a:spLocks noGrp="1"/>
-          </p:cNvSpPr>
-          <p:nvPr>
-            <p:ph type="sldNum" sz="quarter" idx="2"/>
-          </p:nvPr>
-        </p:nvSpPr>
-        <p:spPr>
-          <a:xfrm>
-            <a:off x="6311900" y="9080500"/>
-            <a:ext cx="384506" cy="368300"/>
-          </a:xfrm>
-          <a:prstGeom prst="rect">
-            <a:avLst/>
-          </a:prstGeom>
-        </p:spPr>
-        <p:txBody>
-          <a:bodyPr wrap="none" lIns="0" tIns="0" rIns="0" bIns="0" anchor="t"/>
-          <a:lstStyle>
-            <a:lvl1pPr algn="ctr" defTabSz="584200">
-              <a:defRPr sz="1800">
-                <a:solidFill>
-                  <a:srgbClr val="FFFFFF"/>
-                </a:solidFill>
-                <a:latin typeface="+mn-lt"/>
-                <a:ea typeface="+mn-ea"/>
-                <a:cs typeface="+mn-cs"/>
-                <a:sym typeface="American Typewriter"/>
-              </a:defRPr>
-            </a:lvl1pPr>
-          </a:lstStyle>
-          <a:p>
-            <a:pPr lvl="0"/>
-            <a:fld id="{86CB4B4D-7CA3-9044-876B-883B54F8677D}" type="slidenum">
-              <a:t>‹#›</a:t>
-            </a:fld>
-            <a:endParaRPr/>
-          </a:p>
-        </p:txBody>
-      </p:sp>
-    </p:spTree>
-  </p:cSld>
-  <p:clrMapOvr>
-    <a:masterClrMapping/>
-  </p:clrMapOvr>
-  <p:transition spd="med"/>
+  <p:timing>
+    <p:tnLst>
+      <p:par>
+        <p:cTn id="1" dur="indefinite" restart="never" nodeType="tmRoot"/>
+      </p:par>
+    </p:tnLst>
+  </p:timing>
 </p:sldLayout>
 </file>
 
@@ -3355,7 +1075,7 @@
           </a:ln>
           <a:extLst>
             <a:ext uri="{C572A759-6A51-4108-AA02-DFA0A04FC94B}">
-              <ma14:wrappingTextBoxFlag xmlns:ma14="http://schemas.microsoft.com/office/mac/drawingml/2011/main" xmlns="" val="1"/>
+              <ma14:wrappingTextBoxFlag xmlns:ma14="http://schemas.microsoft.com/office/mac/drawingml/2011/main" val="1"/>
             </a:ext>
           </a:extLst>
         </p:spPr>
@@ -3406,7 +1126,7 @@
           </a:ln>
           <a:extLst>
             <a:ext uri="{C572A759-6A51-4108-AA02-DFA0A04FC94B}">
-              <ma14:wrappingTextBoxFlag xmlns:ma14="http://schemas.microsoft.com/office/mac/drawingml/2011/main" xmlns="" val="1"/>
+              <ma14:wrappingTextBoxFlag xmlns:ma14="http://schemas.microsoft.com/office/mac/drawingml/2011/main" val="1"/>
             </a:ext>
           </a:extLst>
         </p:spPr>
@@ -3556,17 +1276,15 @@
   <p:sldLayoutIdLst>
     <p:sldLayoutId id="2147483649" r:id="rId1"/>
     <p:sldLayoutId id="2147483650" r:id="rId2"/>
-    <p:sldLayoutId id="2147483654" r:id="rId3"/>
-    <p:sldLayoutId id="2147483655" r:id="rId4"/>
-    <p:sldLayoutId id="2147483656" r:id="rId5"/>
-    <p:sldLayoutId id="2147483657" r:id="rId6"/>
-    <p:sldLayoutId id="2147483658" r:id="rId7"/>
-    <p:sldLayoutId id="2147483659" r:id="rId8"/>
-    <p:sldLayoutId id="2147483660" r:id="rId9"/>
-    <p:sldLayoutId id="2147483661" r:id="rId10"/>
-    <p:sldLayoutId id="2147483662" r:id="rId11"/>
   </p:sldLayoutIdLst>
   <p:transition spd="med"/>
+  <p:timing>
+    <p:tnLst>
+      <p:par>
+        <p:cTn id="1" dur="indefinite" restart="never" nodeType="tmRoot"/>
+      </p:par>
+    </p:tnLst>
+  </p:timing>
   <p:txStyles>
     <p:titleStyle>
       <a:lvl1pPr defTabSz="457200">
@@ -3990,19 +1708,24 @@
             </a:pPr>
             <a:r>
               <a:rPr lang="en-US" sz="7200" b="1" dirty="0" smtClean="0">
+                <a:solidFill>
+                  <a:schemeClr val="bg1">
+                    <a:lumMod val="75000"/>
+                    <a:lumOff val="25000"/>
+                  </a:schemeClr>
+                </a:solidFill>
                 <a:latin typeface="나눔고딕" panose="020D0604000000000000" pitchFamily="50" charset="-127"/>
                 <a:ea typeface="나눔고딕" panose="020D0604000000000000" pitchFamily="50" charset="-127"/>
               </a:rPr>
-              <a:t>Recalls &amp; Defects Classification </a:t>
-            </a:r>
-            <a:r>
-              <a:rPr lang="en-US" sz="7200" b="1" dirty="0" smtClean="0">
-                <a:latin typeface="나눔고딕" panose="020D0604000000000000" pitchFamily="50" charset="-127"/>
-                <a:ea typeface="나눔고딕" panose="020D0604000000000000" pitchFamily="50" charset="-127"/>
-              </a:rPr>
-              <a:t>Contest</a:t>
+              <a:t>Recalls &amp; Defects Classification Contest</a:t>
             </a:r>
             <a:endParaRPr sz="7200" b="1" dirty="0">
+              <a:solidFill>
+                <a:schemeClr val="bg1">
+                  <a:lumMod val="75000"/>
+                  <a:lumOff val="25000"/>
+                </a:schemeClr>
+              </a:solidFill>
               <a:latin typeface="나눔고딕" panose="020D0604000000000000" pitchFamily="50" charset="-127"/>
               <a:ea typeface="나눔고딕" panose="020D0604000000000000" pitchFamily="50" charset="-127"/>
             </a:endParaRPr>
@@ -4028,7 +1751,7 @@
           </a:ln>
           <a:extLst>
             <a:ext uri="{C572A759-6A51-4108-AA02-DFA0A04FC94B}">
-              <ma14:wrappingTextBoxFlag xmlns:ma14="http://schemas.microsoft.com/office/mac/drawingml/2011/main" xmlns="" val="1"/>
+              <ma14:wrappingTextBoxFlag xmlns:ma14="http://schemas.microsoft.com/office/mac/drawingml/2011/main" val="1"/>
             </a:ext>
           </a:extLst>
         </p:spPr>
@@ -4224,6 +1947,880 @@
         </p:txBody>
       </p:sp>
     </p:spTree>
+  </p:cSld>
+  <p:clrMapOvr>
+    <a:masterClrMapping/>
+  </p:clrMapOvr>
+  <p:transition spd="med"/>
+  <p:timing>
+    <p:tnLst>
+      <p:par>
+        <p:cTn id="1" dur="indefinite" restart="never" nodeType="tmRoot"/>
+      </p:par>
+    </p:tnLst>
+  </p:timing>
+</p:sld>
+</file>
+
+<file path=ppt/slides/slide10.xml><?xml version="1.0" encoding="utf-8"?>
+<p:sld xmlns:a="http://schemas.openxmlformats.org/drawingml/2006/main" xmlns:r="http://schemas.openxmlformats.org/officeDocument/2006/relationships" xmlns:p="http://schemas.openxmlformats.org/presentationml/2006/main">
+  <p:cSld>
+    <p:spTree>
+      <p:nvGrpSpPr>
+        <p:cNvPr id="1" name=""/>
+        <p:cNvGrpSpPr/>
+        <p:nvPr/>
+      </p:nvGrpSpPr>
+      <p:grpSpPr>
+        <a:xfrm>
+          <a:off x="0" y="0"/>
+          <a:ext cx="0" cy="0"/>
+          <a:chOff x="0" y="0"/>
+          <a:chExt cx="0" cy="0"/>
+        </a:xfrm>
+      </p:grpSpPr>
+      <p:sp>
+        <p:nvSpPr>
+          <p:cNvPr id="3" name="텍스트 개체 틀 2"/>
+          <p:cNvSpPr>
+            <a:spLocks noGrp="1"/>
+          </p:cNvSpPr>
+          <p:nvPr>
+            <p:ph type="body" idx="1"/>
+          </p:nvPr>
+        </p:nvSpPr>
+        <p:spPr>
+          <a:xfrm>
+            <a:off x="1079500" y="2043206"/>
+            <a:ext cx="10845800" cy="7062374"/>
+          </a:xfrm>
+        </p:spPr>
+        <p:txBody>
+          <a:bodyPr anchor="t"/>
+          <a:lstStyle/>
+          <a:p>
+            <a:pPr marL="560388" indent="-560388">
+              <a:buFont typeface="Wingdings" panose="05000000000000000000" pitchFamily="2" charset="2"/>
+              <a:buChar char="v"/>
+            </a:pPr>
+            <a:r>
+              <a:rPr lang="en-US" altLang="ko-KR" sz="2400" dirty="0"/>
+              <a:t>Kernel</a:t>
+            </a:r>
+            <a:r>
+              <a:rPr lang="ko-KR" altLang="en-US" sz="2400" dirty="0"/>
+              <a:t>을 결정짓는 다양한 모델이 있음</a:t>
+            </a:r>
+          </a:p>
+          <a:p>
+            <a:pPr marL="560388" indent="-560388">
+              <a:buFont typeface="Wingdings" panose="05000000000000000000" pitchFamily="2" charset="2"/>
+              <a:buChar char="v"/>
+            </a:pPr>
+            <a:r>
+              <a:rPr lang="en-US" altLang="ko-KR" sz="2400" b="1" dirty="0"/>
+              <a:t>Linear, rdf,</a:t>
+            </a:r>
+            <a:r>
+              <a:rPr lang="ko-KR" altLang="en-US" sz="2400" b="1" dirty="0"/>
+              <a:t> </a:t>
+            </a:r>
+            <a:r>
+              <a:rPr lang="en-US" altLang="ko-KR" sz="2400" b="1" dirty="0"/>
+              <a:t>poly </a:t>
+            </a:r>
+            <a:r>
+              <a:rPr lang="ko-KR" altLang="en-US" sz="2400" b="1" dirty="0"/>
+              <a:t>등등</a:t>
+            </a:r>
+            <a:endParaRPr lang="en-US" altLang="ko-KR" sz="2400" b="1" dirty="0" smtClean="0"/>
+          </a:p>
+        </p:txBody>
+      </p:sp>
+      <p:sp>
+        <p:nvSpPr>
+          <p:cNvPr id="2" name="제목 1"/>
+          <p:cNvSpPr>
+            <a:spLocks noGrp="1"/>
+          </p:cNvSpPr>
+          <p:nvPr>
+            <p:ph type="title"/>
+          </p:nvPr>
+        </p:nvSpPr>
+        <p:spPr/>
+        <p:txBody>
+          <a:bodyPr/>
+          <a:lstStyle/>
+          <a:p>
+            <a:pPr algn="l"/>
+            <a:r>
+              <a:rPr lang="en-US" altLang="ko-KR" dirty="0" smtClean="0">
+                <a:solidFill>
+                  <a:schemeClr val="bg1">
+                    <a:lumMod val="75000"/>
+                    <a:lumOff val="25000"/>
+                  </a:schemeClr>
+                </a:solidFill>
+              </a:rPr>
+              <a:t>SVM</a:t>
+            </a:r>
+            <a:endParaRPr lang="ko-KR" altLang="en-US" dirty="0">
+              <a:solidFill>
+                <a:schemeClr val="bg1">
+                  <a:lumMod val="75000"/>
+                  <a:lumOff val="25000"/>
+                </a:schemeClr>
+              </a:solidFill>
+            </a:endParaRPr>
+          </a:p>
+        </p:txBody>
+      </p:sp>
+      <p:pic>
+        <p:nvPicPr>
+          <p:cNvPr id="4" name="Picture 3"/>
+          <p:cNvPicPr>
+            <a:picLocks noChangeAspect="1"/>
+          </p:cNvPicPr>
+          <p:nvPr/>
+        </p:nvPicPr>
+        <p:blipFill>
+          <a:blip r:embed="rId2"/>
+          <a:stretch>
+            <a:fillRect/>
+          </a:stretch>
+        </p:blipFill>
+        <p:spPr>
+          <a:xfrm>
+            <a:off x="1263650" y="5079448"/>
+            <a:ext cx="4991100" cy="2006600"/>
+          </a:xfrm>
+          <a:prstGeom prst="rect">
+            <a:avLst/>
+          </a:prstGeom>
+        </p:spPr>
+      </p:pic>
+      <p:pic>
+        <p:nvPicPr>
+          <p:cNvPr id="6" name="Picture 5"/>
+          <p:cNvPicPr>
+            <a:picLocks noChangeAspect="1"/>
+          </p:cNvPicPr>
+          <p:nvPr/>
+        </p:nvPicPr>
+        <p:blipFill>
+          <a:blip r:embed="rId3"/>
+          <a:stretch>
+            <a:fillRect/>
+          </a:stretch>
+        </p:blipFill>
+        <p:spPr>
+          <a:xfrm>
+            <a:off x="6728515" y="4681607"/>
+            <a:ext cx="5829300" cy="3517900"/>
+          </a:xfrm>
+          <a:prstGeom prst="rect">
+            <a:avLst/>
+          </a:prstGeom>
+        </p:spPr>
+      </p:pic>
+    </p:spTree>
+    <p:extLst>
+      <p:ext uri="{BB962C8B-B14F-4D97-AF65-F5344CB8AC3E}">
+        <p14:creationId xmlns:p14="http://schemas.microsoft.com/office/powerpoint/2010/main" val="874131187"/>
+      </p:ext>
+    </p:extLst>
+  </p:cSld>
+  <p:clrMapOvr>
+    <a:masterClrMapping/>
+  </p:clrMapOvr>
+  <p:transition spd="med"/>
+  <p:timing>
+    <p:tnLst>
+      <p:par>
+        <p:cTn id="1" dur="indefinite" restart="never" nodeType="tmRoot"/>
+      </p:par>
+    </p:tnLst>
+  </p:timing>
+</p:sld>
+</file>
+
+<file path=ppt/slides/slide11.xml><?xml version="1.0" encoding="utf-8"?>
+<p:sld xmlns:a="http://schemas.openxmlformats.org/drawingml/2006/main" xmlns:r="http://schemas.openxmlformats.org/officeDocument/2006/relationships" xmlns:p="http://schemas.openxmlformats.org/presentationml/2006/main">
+  <p:cSld>
+    <p:spTree>
+      <p:nvGrpSpPr>
+        <p:cNvPr id="1" name=""/>
+        <p:cNvGrpSpPr/>
+        <p:nvPr/>
+      </p:nvGrpSpPr>
+      <p:grpSpPr>
+        <a:xfrm>
+          <a:off x="0" y="0"/>
+          <a:ext cx="0" cy="0"/>
+          <a:chOff x="0" y="0"/>
+          <a:chExt cx="0" cy="0"/>
+        </a:xfrm>
+      </p:grpSpPr>
+      <p:sp>
+        <p:nvSpPr>
+          <p:cNvPr id="3" name="텍스트 개체 틀 2"/>
+          <p:cNvSpPr>
+            <a:spLocks noGrp="1"/>
+          </p:cNvSpPr>
+          <p:nvPr>
+            <p:ph type="body" idx="1"/>
+          </p:nvPr>
+        </p:nvSpPr>
+        <p:spPr>
+          <a:xfrm>
+            <a:off x="1079500" y="2043206"/>
+            <a:ext cx="10845800" cy="7062374"/>
+          </a:xfrm>
+        </p:spPr>
+        <p:txBody>
+          <a:bodyPr anchor="t"/>
+          <a:lstStyle/>
+          <a:p>
+            <a:pPr marL="560388" indent="-560388">
+              <a:buFont typeface="Wingdings" panose="05000000000000000000" pitchFamily="2" charset="2"/>
+              <a:buChar char="v"/>
+            </a:pPr>
+            <a:r>
+              <a:rPr lang="en-US" altLang="ko-KR" sz="2400" b="1" dirty="0"/>
+              <a:t>Linear </a:t>
+            </a:r>
+            <a:r>
+              <a:rPr lang="ko-KR" altLang="en-US" sz="2400" b="1" dirty="0"/>
+              <a:t>모델</a:t>
+            </a:r>
+            <a:r>
+              <a:rPr lang="en-US" altLang="ko-KR" sz="2400" b="1" dirty="0"/>
+              <a:t>,</a:t>
+            </a:r>
+            <a:r>
+              <a:rPr lang="ko-KR" altLang="en-US" sz="2400" b="1" dirty="0"/>
+              <a:t> </a:t>
+            </a:r>
+            <a:r>
+              <a:rPr lang="en-US" altLang="ko-KR" sz="2400" b="1" dirty="0"/>
+              <a:t>rdf </a:t>
+            </a:r>
+            <a:r>
+              <a:rPr lang="ko-KR" altLang="en-US" sz="2400" b="1" dirty="0"/>
+              <a:t>모델을 중점으로 다양한 시도</a:t>
+            </a:r>
+            <a:r>
+              <a:rPr lang="en-US" altLang="ko-KR" sz="2400" b="1" dirty="0"/>
+              <a:t/>
+            </a:r>
+            <a:br>
+              <a:rPr lang="en-US" altLang="ko-KR" sz="2400" b="1" dirty="0"/>
+            </a:br>
+            <a:r>
+              <a:rPr lang="en-US" altLang="ko-KR" sz="2400" b="1" dirty="0"/>
+              <a:t>(</a:t>
+            </a:r>
+            <a:r>
+              <a:rPr lang="ko-KR" altLang="en-US" sz="2400" b="1" dirty="0"/>
+              <a:t>매번 실행시마다 </a:t>
+            </a:r>
+            <a:r>
+              <a:rPr lang="en-US" altLang="ko-KR" sz="2400" b="1" dirty="0"/>
+              <a:t>initial point</a:t>
+            </a:r>
+            <a:r>
+              <a:rPr lang="ko-KR" altLang="en-US" sz="2400" b="1" dirty="0"/>
+              <a:t>에 따라</a:t>
+            </a:r>
+            <a:br>
+              <a:rPr lang="ko-KR" altLang="en-US" sz="2400" b="1" dirty="0"/>
+            </a:br>
+            <a:r>
+              <a:rPr lang="ko-KR" altLang="en-US" sz="2400" b="1" dirty="0"/>
+              <a:t>  결과가 다름</a:t>
+            </a:r>
+            <a:r>
+              <a:rPr lang="en-US" altLang="ko-KR" sz="2400" b="1" dirty="0"/>
+              <a:t>)</a:t>
+            </a:r>
+            <a:endParaRPr lang="en-US" altLang="ko-KR" sz="2400" b="1" dirty="0"/>
+          </a:p>
+        </p:txBody>
+      </p:sp>
+      <p:sp>
+        <p:nvSpPr>
+          <p:cNvPr id="2" name="제목 1"/>
+          <p:cNvSpPr>
+            <a:spLocks noGrp="1"/>
+          </p:cNvSpPr>
+          <p:nvPr>
+            <p:ph type="title"/>
+          </p:nvPr>
+        </p:nvSpPr>
+        <p:spPr/>
+        <p:txBody>
+          <a:bodyPr/>
+          <a:lstStyle/>
+          <a:p>
+            <a:pPr algn="l"/>
+            <a:r>
+              <a:rPr lang="en-US" altLang="ko-KR" dirty="0" smtClean="0">
+                <a:solidFill>
+                  <a:schemeClr val="bg1">
+                    <a:lumMod val="75000"/>
+                    <a:lumOff val="25000"/>
+                  </a:schemeClr>
+                </a:solidFill>
+              </a:rPr>
+              <a:t>SVM</a:t>
+            </a:r>
+            <a:endParaRPr lang="ko-KR" altLang="en-US" dirty="0">
+              <a:solidFill>
+                <a:schemeClr val="bg1">
+                  <a:lumMod val="75000"/>
+                  <a:lumOff val="25000"/>
+                </a:schemeClr>
+              </a:solidFill>
+            </a:endParaRPr>
+          </a:p>
+        </p:txBody>
+      </p:sp>
+      <p:pic>
+        <p:nvPicPr>
+          <p:cNvPr id="5" name="Picture 4"/>
+          <p:cNvPicPr>
+            <a:picLocks noChangeAspect="1"/>
+          </p:cNvPicPr>
+          <p:nvPr/>
+        </p:nvPicPr>
+        <p:blipFill>
+          <a:blip r:embed="rId2"/>
+          <a:stretch>
+            <a:fillRect/>
+          </a:stretch>
+        </p:blipFill>
+        <p:spPr>
+          <a:xfrm>
+            <a:off x="1486241" y="3722044"/>
+            <a:ext cx="5016159" cy="3909391"/>
+          </a:xfrm>
+          <a:prstGeom prst="rect">
+            <a:avLst/>
+          </a:prstGeom>
+          <a:ln w="34925">
+            <a:solidFill>
+              <a:schemeClr val="bg1">
+                <a:lumMod val="50000"/>
+                <a:lumOff val="50000"/>
+              </a:schemeClr>
+            </a:solidFill>
+          </a:ln>
+        </p:spPr>
+      </p:pic>
+      <p:pic>
+        <p:nvPicPr>
+          <p:cNvPr id="7" name="Picture 6"/>
+          <p:cNvPicPr>
+            <a:picLocks noChangeAspect="1"/>
+          </p:cNvPicPr>
+          <p:nvPr/>
+        </p:nvPicPr>
+        <p:blipFill>
+          <a:blip r:embed="rId3"/>
+          <a:stretch>
+            <a:fillRect/>
+          </a:stretch>
+        </p:blipFill>
+        <p:spPr>
+          <a:xfrm>
+            <a:off x="7308964" y="2500713"/>
+            <a:ext cx="4444859" cy="3351729"/>
+          </a:xfrm>
+          <a:prstGeom prst="rect">
+            <a:avLst/>
+          </a:prstGeom>
+          <a:ln w="34925">
+            <a:solidFill>
+              <a:schemeClr val="bg1">
+                <a:lumMod val="50000"/>
+                <a:lumOff val="50000"/>
+              </a:schemeClr>
+            </a:solidFill>
+          </a:ln>
+        </p:spPr>
+      </p:pic>
+      <p:pic>
+        <p:nvPicPr>
+          <p:cNvPr id="8" name="Picture 7"/>
+          <p:cNvPicPr>
+            <a:picLocks noChangeAspect="1"/>
+          </p:cNvPicPr>
+          <p:nvPr/>
+        </p:nvPicPr>
+        <p:blipFill>
+          <a:blip r:embed="rId4"/>
+          <a:stretch>
+            <a:fillRect/>
+          </a:stretch>
+        </p:blipFill>
+        <p:spPr>
+          <a:xfrm>
+            <a:off x="7308964" y="6141720"/>
+            <a:ext cx="4616335" cy="3572066"/>
+          </a:xfrm>
+          <a:prstGeom prst="rect">
+            <a:avLst/>
+          </a:prstGeom>
+          <a:ln w="34925">
+            <a:solidFill>
+              <a:schemeClr val="bg1">
+                <a:lumMod val="50000"/>
+                <a:lumOff val="50000"/>
+              </a:schemeClr>
+            </a:solidFill>
+          </a:ln>
+        </p:spPr>
+      </p:pic>
+    </p:spTree>
+    <p:extLst>
+      <p:ext uri="{BB962C8B-B14F-4D97-AF65-F5344CB8AC3E}">
+        <p14:creationId xmlns:p14="http://schemas.microsoft.com/office/powerpoint/2010/main" val="329691685"/>
+      </p:ext>
+    </p:extLst>
+  </p:cSld>
+  <p:clrMapOvr>
+    <a:masterClrMapping/>
+  </p:clrMapOvr>
+  <p:transition spd="med"/>
+  <p:timing>
+    <p:tnLst>
+      <p:par>
+        <p:cTn id="1" dur="indefinite" restart="never" nodeType="tmRoot"/>
+      </p:par>
+    </p:tnLst>
+  </p:timing>
+</p:sld>
+</file>
+
+<file path=ppt/slides/slide12.xml><?xml version="1.0" encoding="utf-8"?>
+<p:sld xmlns:a="http://schemas.openxmlformats.org/drawingml/2006/main" xmlns:r="http://schemas.openxmlformats.org/officeDocument/2006/relationships" xmlns:p="http://schemas.openxmlformats.org/presentationml/2006/main">
+  <p:cSld>
+    <p:spTree>
+      <p:nvGrpSpPr>
+        <p:cNvPr id="1" name=""/>
+        <p:cNvGrpSpPr/>
+        <p:nvPr/>
+      </p:nvGrpSpPr>
+      <p:grpSpPr>
+        <a:xfrm>
+          <a:off x="0" y="0"/>
+          <a:ext cx="0" cy="0"/>
+          <a:chOff x="0" y="0"/>
+          <a:chExt cx="0" cy="0"/>
+        </a:xfrm>
+      </p:grpSpPr>
+      <p:sp>
+        <p:nvSpPr>
+          <p:cNvPr id="2" name="Title 1"/>
+          <p:cNvSpPr>
+            <a:spLocks noGrp="1"/>
+          </p:cNvSpPr>
+          <p:nvPr>
+            <p:ph type="title"/>
+          </p:nvPr>
+        </p:nvSpPr>
+        <p:spPr/>
+        <p:txBody>
+          <a:bodyPr/>
+          <a:lstStyle/>
+          <a:p>
+            <a:pPr algn="l"/>
+            <a:r>
+              <a:rPr lang="en-US">
+                <a:solidFill>
+                  <a:schemeClr val="bg1">
+                    <a:lumMod val="75000"/>
+                    <a:lumOff val="25000"/>
+                  </a:schemeClr>
+                </a:solidFill>
+              </a:rPr>
+              <a:t>Discussion</a:t>
+            </a:r>
+            <a:endParaRPr lang="en-US">
+              <a:solidFill>
+                <a:schemeClr val="bg1">
+                  <a:lumMod val="75000"/>
+                  <a:lumOff val="25000"/>
+                </a:schemeClr>
+              </a:solidFill>
+            </a:endParaRPr>
+          </a:p>
+        </p:txBody>
+      </p:sp>
+      <p:sp>
+        <p:nvSpPr>
+          <p:cNvPr id="3" name="Text Placeholder 2"/>
+          <p:cNvSpPr>
+            <a:spLocks noGrp="1"/>
+          </p:cNvSpPr>
+          <p:nvPr>
+            <p:ph type="body" idx="1"/>
+          </p:nvPr>
+        </p:nvSpPr>
+        <p:spPr>
+          <a:solidFill>
+            <a:schemeClr val="tx1">
+              <a:alpha val="85000"/>
+            </a:schemeClr>
+          </a:solidFill>
+        </p:spPr>
+        <p:txBody>
+          <a:bodyPr/>
+          <a:lstStyle/>
+          <a:p>
+            <a:r>
+              <a:rPr lang="ko-KR" altLang="en-US"/>
+              <a:t>우리 과제과 같은 시나리오에서</a:t>
+            </a:r>
+            <a:r>
+              <a:rPr lang="en-US" altLang="ko-KR"/>
+              <a:t>,</a:t>
+            </a:r>
+            <a:r>
+              <a:rPr lang="ko-KR" altLang="en-US"/>
+              <a:t> 데이터의 </a:t>
+            </a:r>
+            <a:r>
+              <a:rPr lang="en-US" altLang="ko-KR"/>
+              <a:t>over-fitting</a:t>
+            </a:r>
+            <a:r>
+              <a:rPr lang="ko-KR" altLang="en-US"/>
+              <a:t>은 꼭 나쁜 것인가</a:t>
+            </a:r>
+            <a:r>
+              <a:rPr lang="en-US" altLang="ko-KR"/>
+              <a:t>?</a:t>
+            </a:r>
+            <a:endParaRPr lang="ko-KR" altLang="en-US"/>
+          </a:p>
+          <a:p>
+            <a:pPr lvl="1"/>
+            <a:r>
+              <a:rPr lang="ko-KR" altLang="en-US"/>
+              <a:t>데이터의 특징을 잡아 모델을 구체화하는 과정이며</a:t>
+            </a:r>
+            <a:r>
+              <a:rPr lang="en-US" altLang="ko-KR"/>
+              <a:t>,</a:t>
+            </a:r>
+            <a:r>
+              <a:rPr lang="ko-KR" altLang="en-US"/>
+              <a:t> 실무에서도 필요한 부분이 아닌지</a:t>
+            </a:r>
+          </a:p>
+        </p:txBody>
+      </p:sp>
+    </p:spTree>
+    <p:extLst>
+      <p:ext uri="{BB962C8B-B14F-4D97-AF65-F5344CB8AC3E}">
+        <p14:creationId xmlns:p14="http://schemas.microsoft.com/office/powerpoint/2010/main" val="613457011"/>
+      </p:ext>
+    </p:extLst>
+  </p:cSld>
+  <p:clrMapOvr>
+    <a:masterClrMapping/>
+  </p:clrMapOvr>
+  <p:transition spd="med"/>
+  <p:timing>
+    <p:tnLst>
+      <p:par>
+        <p:cTn id="1" dur="indefinite" restart="never" nodeType="tmRoot"/>
+      </p:par>
+    </p:tnLst>
+  </p:timing>
+</p:sld>
+</file>
+
+<file path=ppt/slides/slide13.xml><?xml version="1.0" encoding="utf-8"?>
+<p:sld xmlns:a="http://schemas.openxmlformats.org/drawingml/2006/main" xmlns:r="http://schemas.openxmlformats.org/officeDocument/2006/relationships" xmlns:p="http://schemas.openxmlformats.org/presentationml/2006/main">
+  <p:cSld>
+    <p:spTree>
+      <p:nvGrpSpPr>
+        <p:cNvPr id="1" name=""/>
+        <p:cNvGrpSpPr/>
+        <p:nvPr/>
+      </p:nvGrpSpPr>
+      <p:grpSpPr>
+        <a:xfrm>
+          <a:off x="0" y="0"/>
+          <a:ext cx="0" cy="0"/>
+          <a:chOff x="0" y="0"/>
+          <a:chExt cx="0" cy="0"/>
+        </a:xfrm>
+      </p:grpSpPr>
+      <p:sp>
+        <p:nvSpPr>
+          <p:cNvPr id="2" name="Title 1"/>
+          <p:cNvSpPr>
+            <a:spLocks noGrp="1"/>
+          </p:cNvSpPr>
+          <p:nvPr>
+            <p:ph type="title"/>
+          </p:nvPr>
+        </p:nvSpPr>
+        <p:spPr/>
+        <p:txBody>
+          <a:bodyPr/>
+          <a:lstStyle/>
+          <a:p>
+            <a:pPr algn="l"/>
+            <a:r>
+              <a:rPr lang="en-US">
+                <a:solidFill>
+                  <a:schemeClr val="bg1">
+                    <a:lumMod val="75000"/>
+                    <a:lumOff val="25000"/>
+                  </a:schemeClr>
+                </a:solidFill>
+              </a:rPr>
+              <a:t>Tools Used</a:t>
+            </a:r>
+          </a:p>
+        </p:txBody>
+      </p:sp>
+      <p:sp>
+        <p:nvSpPr>
+          <p:cNvPr id="3" name="Text Placeholder 2"/>
+          <p:cNvSpPr>
+            <a:spLocks noGrp="1"/>
+          </p:cNvSpPr>
+          <p:nvPr>
+            <p:ph type="body" idx="1"/>
+          </p:nvPr>
+        </p:nvSpPr>
+        <p:spPr>
+          <a:solidFill>
+            <a:schemeClr val="tx1">
+              <a:alpha val="85000"/>
+            </a:schemeClr>
+          </a:solidFill>
+        </p:spPr>
+        <p:txBody>
+          <a:bodyPr/>
+          <a:lstStyle/>
+          <a:p>
+            <a:r>
+              <a:rPr lang="en-US" b="1"/>
+              <a:t>Language:</a:t>
+            </a:r>
+            <a:r>
+              <a:rPr lang="en-US"/>
+              <a:t> Python 3.0</a:t>
+            </a:r>
+          </a:p>
+          <a:p>
+            <a:pPr lvl="1"/>
+            <a:r>
+              <a:rPr lang="en-US"/>
+              <a:t>numpy, scipy, scikit-learn</a:t>
+            </a:r>
+          </a:p>
+          <a:p>
+            <a:pPr lvl="1"/>
+            <a:r>
+              <a:rPr lang="en-US"/>
+              <a:t>Openpyxl, Jupyter notebook</a:t>
+            </a:r>
+          </a:p>
+          <a:p>
+            <a:r>
+              <a:rPr lang="en-US" b="1"/>
+              <a:t>Editor:</a:t>
+            </a:r>
+            <a:r>
+              <a:rPr lang="en-US"/>
+              <a:t> Sublime Text, Pycharm</a:t>
+            </a:r>
+          </a:p>
+          <a:p>
+            <a:r>
+              <a:rPr lang="en-US" b="1"/>
+              <a:t>Version Control:</a:t>
+            </a:r>
+            <a:r>
+              <a:rPr lang="en-US"/>
+              <a:t> Github, SourceTree</a:t>
+            </a:r>
+          </a:p>
+          <a:p>
+            <a:pPr lvl="1"/>
+            <a:r>
+              <a:rPr lang="en-US"/>
+              <a:t>https://github.com/tebica/datacontest</a:t>
+            </a:r>
+          </a:p>
+          <a:p>
+            <a:endParaRPr lang="en-US"/>
+          </a:p>
+        </p:txBody>
+      </p:sp>
+    </p:spTree>
+    <p:extLst>
+      <p:ext uri="{BB962C8B-B14F-4D97-AF65-F5344CB8AC3E}">
+        <p14:creationId xmlns:p14="http://schemas.microsoft.com/office/powerpoint/2010/main" val="31855579"/>
+      </p:ext>
+    </p:extLst>
+  </p:cSld>
+  <p:clrMapOvr>
+    <a:masterClrMapping/>
+  </p:clrMapOvr>
+  <p:transition spd="med"/>
+  <p:timing>
+    <p:tnLst>
+      <p:par>
+        <p:cTn id="1" dur="indefinite" restart="never" nodeType="tmRoot"/>
+      </p:par>
+    </p:tnLst>
+  </p:timing>
+</p:sld>
+</file>
+
+<file path=ppt/slides/slide14.xml><?xml version="1.0" encoding="utf-8"?>
+<p:sld xmlns:a="http://schemas.openxmlformats.org/drawingml/2006/main" xmlns:r="http://schemas.openxmlformats.org/officeDocument/2006/relationships" xmlns:p="http://schemas.openxmlformats.org/presentationml/2006/main">
+  <p:cSld>
+    <p:spTree>
+      <p:nvGrpSpPr>
+        <p:cNvPr id="1" name=""/>
+        <p:cNvGrpSpPr/>
+        <p:nvPr/>
+      </p:nvGrpSpPr>
+      <p:grpSpPr>
+        <a:xfrm>
+          <a:off x="0" y="0"/>
+          <a:ext cx="0" cy="0"/>
+          <a:chOff x="0" y="0"/>
+          <a:chExt cx="0" cy="0"/>
+        </a:xfrm>
+      </p:grpSpPr>
+      <p:sp>
+        <p:nvSpPr>
+          <p:cNvPr id="2" name="Title 1"/>
+          <p:cNvSpPr>
+            <a:spLocks noGrp="1"/>
+          </p:cNvSpPr>
+          <p:nvPr>
+            <p:ph type="title"/>
+          </p:nvPr>
+        </p:nvSpPr>
+        <p:spPr/>
+        <p:txBody>
+          <a:bodyPr/>
+          <a:lstStyle/>
+          <a:p>
+            <a:pPr algn="l"/>
+            <a:r>
+              <a:rPr lang="en-US">
+                <a:solidFill>
+                  <a:schemeClr val="bg1">
+                    <a:lumMod val="75000"/>
+                    <a:lumOff val="25000"/>
+                  </a:schemeClr>
+                </a:solidFill>
+              </a:rPr>
+              <a:t>Reference</a:t>
+            </a:r>
+          </a:p>
+        </p:txBody>
+      </p:sp>
+      <p:sp>
+        <p:nvSpPr>
+          <p:cNvPr id="3" name="Text Placeholder 2"/>
+          <p:cNvSpPr>
+            <a:spLocks noGrp="1"/>
+          </p:cNvSpPr>
+          <p:nvPr>
+            <p:ph type="body" idx="1"/>
+          </p:nvPr>
+        </p:nvSpPr>
+        <p:spPr>
+          <a:solidFill>
+            <a:schemeClr val="tx1">
+              <a:alpha val="85000"/>
+            </a:schemeClr>
+          </a:solidFill>
+        </p:spPr>
+        <p:txBody>
+          <a:bodyPr/>
+          <a:lstStyle/>
+          <a:p>
+            <a:r>
+              <a:rPr lang="en-US"/>
+              <a:t>Doing Data Science</a:t>
+            </a:r>
+            <a:br>
+              <a:rPr lang="en-US"/>
+            </a:br>
+            <a:r>
+              <a:rPr lang="en-US" sz="2800"/>
+              <a:t> - Rachel Schutt &amp; Cathy O’Neil</a:t>
+            </a:r>
+          </a:p>
+          <a:p>
+            <a:r>
+              <a:rPr lang="en-US"/>
+              <a:t>Machine Learning in Action</a:t>
+            </a:r>
+            <a:br>
+              <a:rPr lang="en-US"/>
+            </a:br>
+            <a:r>
+              <a:rPr lang="en-US" sz="2800"/>
+              <a:t> - Peter Harrington</a:t>
+            </a:r>
+          </a:p>
+          <a:p>
+            <a:r>
+              <a:rPr lang="en-US" altLang="ko-KR" sz="2800"/>
+              <a:t>SVM </a:t>
+            </a:r>
+            <a:r>
+              <a:rPr lang="ko-KR" altLang="en-US" sz="2800"/>
+              <a:t>분류기를 이용한 문서 범주화 연구</a:t>
+            </a:r>
+            <a:r>
+              <a:rPr lang="en-US" altLang="ko-KR" sz="2800"/>
+              <a:t/>
+            </a:r>
+            <a:br>
+              <a:rPr lang="en-US" altLang="ko-KR" sz="2800"/>
+            </a:br>
+            <a:r>
+              <a:rPr lang="en-US" altLang="ko-KR" sz="2800"/>
+              <a:t>- </a:t>
+            </a:r>
+            <a:r>
+              <a:rPr lang="ko-KR" altLang="en-US" sz="2800"/>
+              <a:t>정영미</a:t>
+            </a:r>
+            <a:r>
+              <a:rPr lang="en-US" altLang="ko-KR" sz="2800"/>
+              <a:t>, </a:t>
+            </a:r>
+            <a:r>
+              <a:rPr lang="ko-KR" altLang="en-US" sz="2800"/>
+              <a:t>임혜영</a:t>
+            </a:r>
+            <a:endParaRPr lang="en-US" altLang="ko-KR" sz="2800"/>
+          </a:p>
+        </p:txBody>
+      </p:sp>
+    </p:spTree>
+    <p:extLst>
+      <p:ext uri="{BB962C8B-B14F-4D97-AF65-F5344CB8AC3E}">
+        <p14:creationId xmlns:p14="http://schemas.microsoft.com/office/powerpoint/2010/main" val="610385475"/>
+      </p:ext>
+    </p:extLst>
   </p:cSld>
   <p:clrMapOvr>
     <a:masterClrMapping/>
@@ -4284,7 +2881,6 @@
               <a:rPr lang="en-US" altLang="ko-KR" sz="2800" b="1" dirty="0" smtClean="0"/>
               <a:t>Software Recall vs. Non Software Recall</a:t>
             </a:r>
-            <a:endParaRPr lang="en-US" altLang="ko-KR" sz="2800" b="1" dirty="0" smtClean="0"/>
           </a:p>
         </p:txBody>
       </p:sp>
@@ -4305,10 +2901,24 @@
           <a:p>
             <a:pPr algn="l"/>
             <a:r>
-              <a:rPr lang="en-US" altLang="ko-KR" sz="5400" dirty="0" smtClean="0"/>
+              <a:rPr lang="en-US" altLang="ko-KR" b="1" dirty="0" smtClean="0">
+                <a:solidFill>
+                  <a:schemeClr val="bg1">
+                    <a:lumMod val="75000"/>
+                    <a:lumOff val="25000"/>
+                  </a:schemeClr>
+                </a:solidFill>
+              </a:rPr>
               <a:t>Data Analysis</a:t>
             </a:r>
-            <a:endParaRPr lang="ko-KR" altLang="en-US" sz="5400" dirty="0"/>
+            <a:endParaRPr lang="ko-KR" altLang="en-US" b="1" dirty="0">
+              <a:solidFill>
+                <a:schemeClr val="bg1">
+                  <a:lumMod val="75000"/>
+                  <a:lumOff val="25000"/>
+                </a:schemeClr>
+              </a:solidFill>
+            </a:endParaRPr>
           </a:p>
         </p:txBody>
       </p:sp>
@@ -4487,10 +3097,24 @@
           <a:p>
             <a:pPr algn="l"/>
             <a:r>
-              <a:rPr lang="en-US" altLang="ko-KR" sz="5400" dirty="0" smtClean="0"/>
+              <a:rPr lang="en-US" altLang="ko-KR" dirty="0" smtClean="0">
+                <a:solidFill>
+                  <a:schemeClr val="bg1">
+                    <a:lumMod val="75000"/>
+                    <a:lumOff val="25000"/>
+                  </a:schemeClr>
+                </a:solidFill>
+              </a:rPr>
               <a:t>Filters</a:t>
             </a:r>
-            <a:endParaRPr lang="ko-KR" altLang="en-US" sz="5400" dirty="0"/>
+            <a:endParaRPr lang="ko-KR" altLang="en-US" dirty="0">
+              <a:solidFill>
+                <a:schemeClr val="bg1">
+                  <a:lumMod val="75000"/>
+                  <a:lumOff val="25000"/>
+                </a:schemeClr>
+              </a:solidFill>
+            </a:endParaRPr>
           </a:p>
         </p:txBody>
       </p:sp>
@@ -4549,8 +3173,19 @@
           <a:p>
             <a:pPr algn="l"/>
             <a:r>
+              <a:rPr lang="en-US" altLang="ko-KR" dirty="0">
+                <a:solidFill>
+                  <a:schemeClr val="bg1">
+                    <a:lumMod val="75000"/>
+                    <a:lumOff val="25000"/>
+                  </a:schemeClr>
+                </a:solidFill>
+              </a:rPr>
+              <a:t>Naïve</a:t>
+            </a:r>
+            <a:r>
               <a:rPr lang="en-US" altLang="ko-KR" sz="5400" dirty="0" smtClean="0"/>
-              <a:t>Naïve Bayesian </a:t>
+              <a:t> Bayesian </a:t>
             </a:r>
             <a:endParaRPr lang="ko-KR" altLang="en-US" sz="5400" dirty="0"/>
           </a:p>
@@ -4930,7 +3565,6 @@
               <a:rPr lang="en-US" altLang="ko-KR" sz="2800" b="1" dirty="0" smtClean="0"/>
               <a:t>accuracy</a:t>
             </a:r>
-            <a:endParaRPr lang="en-US" altLang="ko-KR" sz="2800" b="1" dirty="0" smtClean="0"/>
           </a:p>
           <a:p>
             <a:pPr lvl="1">
@@ -4978,10 +3612,35 @@
           <a:p>
             <a:pPr algn="l"/>
             <a:r>
-              <a:rPr lang="en-US" altLang="ko-KR" sz="5400" dirty="0" smtClean="0"/>
-              <a:t>Feature Selection</a:t>
-            </a:r>
-            <a:endParaRPr lang="ko-KR" altLang="en-US" sz="5400" dirty="0"/>
+              <a:rPr lang="en-US" altLang="ko-KR" dirty="0">
+                <a:solidFill>
+                  <a:schemeClr val="bg1">
+                    <a:lumMod val="75000"/>
+                    <a:lumOff val="25000"/>
+                  </a:schemeClr>
+                </a:solidFill>
+              </a:rPr>
+              <a:t>Feature</a:t>
+            </a:r>
+            <a:r>
+              <a:rPr lang="en-US" altLang="ko-KR" dirty="0" smtClean="0">
+                <a:solidFill>
+                  <a:schemeClr val="bg1">
+                    <a:lumMod val="75000"/>
+                    <a:lumOff val="25000"/>
+                  </a:schemeClr>
+                </a:solidFill>
+              </a:rPr>
+              <a:t> Selection</a:t>
+            </a:r>
+            <a:endParaRPr lang="ko-KR" altLang="en-US" dirty="0">
+              <a:solidFill>
+                <a:schemeClr val="bg1">
+                  <a:lumMod val="75000"/>
+                  <a:lumOff val="25000"/>
+                </a:schemeClr>
+              </a:solidFill>
+            </a:endParaRPr>
           </a:p>
         </p:txBody>
       </p:sp>
@@ -4994,14 +3653,14 @@
           <p:nvPr>
             <p:extLst>
               <p:ext uri="{D42A27DB-BD31-4B8C-83A1-F6EECF244321}">
-                <p14:modId xmlns:p14="http://schemas.microsoft.com/office/powerpoint/2010/main" val="3924634460"/>
+                <p14:modId xmlns:p14="http://schemas.microsoft.com/office/powerpoint/2010/main" val="1249508293"/>
               </p:ext>
             </p:extLst>
           </p:nvPr>
         </p:nvGraphicFramePr>
         <p:xfrm>
           <a:off x="1079499" y="4072539"/>
-          <a:ext cx="10845801" cy="5117564"/>
+          <a:ext cx="10845801" cy="5352673"/>
         </p:xfrm>
         <a:graphic>
           <a:graphicData uri="http://schemas.openxmlformats.org/drawingml/2006/table">
@@ -5013,35 +3672,35 @@
                 <a:gridCol w="3197317">
                   <a:extLst>
                     <a:ext uri="{9D8B030D-6E8A-4147-A177-3AD203B41FA5}">
-                      <a16:colId xmlns:a16="http://schemas.microsoft.com/office/drawing/2014/main" val="2276419763"/>
+                      <a16:colId xmlns:a16="http://schemas.microsoft.com/office/drawing/2014/main" xmlns="" val="2276419763"/>
                     </a:ext>
                   </a:extLst>
                 </a:gridCol>
                 <a:gridCol w="1563050">
                   <a:extLst>
                     <a:ext uri="{9D8B030D-6E8A-4147-A177-3AD203B41FA5}">
-                      <a16:colId xmlns:a16="http://schemas.microsoft.com/office/drawing/2014/main" val="4217228757"/>
+                      <a16:colId xmlns:a16="http://schemas.microsoft.com/office/drawing/2014/main" xmlns="" val="4217228757"/>
                     </a:ext>
                   </a:extLst>
                 </a:gridCol>
                 <a:gridCol w="1344705">
                   <a:extLst>
                     <a:ext uri="{9D8B030D-6E8A-4147-A177-3AD203B41FA5}">
-                      <a16:colId xmlns:a16="http://schemas.microsoft.com/office/drawing/2014/main" val="3968401123"/>
+                      <a16:colId xmlns:a16="http://schemas.microsoft.com/office/drawing/2014/main" xmlns="" val="3968401123"/>
                     </a:ext>
                   </a:extLst>
                 </a:gridCol>
                 <a:gridCol w="1859537">
                   <a:extLst>
                     <a:ext uri="{9D8B030D-6E8A-4147-A177-3AD203B41FA5}">
-                      <a16:colId xmlns:a16="http://schemas.microsoft.com/office/drawing/2014/main" val="2384906110"/>
+                      <a16:colId xmlns:a16="http://schemas.microsoft.com/office/drawing/2014/main" xmlns="" val="2384906110"/>
                     </a:ext>
                   </a:extLst>
                 </a:gridCol>
                 <a:gridCol w="2881192">
                   <a:extLst>
                     <a:ext uri="{9D8B030D-6E8A-4147-A177-3AD203B41FA5}">
-                      <a16:colId xmlns:a16="http://schemas.microsoft.com/office/drawing/2014/main" val="327921841"/>
+                      <a16:colId xmlns:a16="http://schemas.microsoft.com/office/drawing/2014/main" xmlns="" val="327921841"/>
                     </a:ext>
                   </a:extLst>
                 </a:gridCol>
@@ -5444,7 +4103,7 @@
                 </a:tc>
                 <a:extLst>
                   <a:ext uri="{0D108BD9-81ED-4DB2-BD59-A6C34878D82A}">
-                    <a16:rowId xmlns:a16="http://schemas.microsoft.com/office/drawing/2014/main" val="3381792113"/>
+                    <a16:rowId xmlns:a16="http://schemas.microsoft.com/office/drawing/2014/main" xmlns="" val="3381792113"/>
                   </a:ext>
                 </a:extLst>
               </a:tr>
@@ -5511,6 +4170,9 @@
                       <a:headEnd type="none" w="med" len="med"/>
                       <a:tailEnd type="none" w="med" len="med"/>
                     </a:lnB>
+                    <a:solidFill>
+                      <a:srgbClr val="FFFFFF"/>
+                    </a:solidFill>
                   </a:tcPr>
                 </a:tc>
                 <a:tc>
@@ -5771,7 +4433,7 @@
                 </a:tc>
                 <a:extLst>
                   <a:ext uri="{0D108BD9-81ED-4DB2-BD59-A6C34878D82A}">
-                    <a16:rowId xmlns:a16="http://schemas.microsoft.com/office/drawing/2014/main" val="2941105388"/>
+                    <a16:rowId xmlns:a16="http://schemas.microsoft.com/office/drawing/2014/main" xmlns="" val="2941105388"/>
                   </a:ext>
                 </a:extLst>
               </a:tr>
@@ -6098,7 +4760,7 @@
                 </a:tc>
                 <a:extLst>
                   <a:ext uri="{0D108BD9-81ED-4DB2-BD59-A6C34878D82A}">
-                    <a16:rowId xmlns:a16="http://schemas.microsoft.com/office/drawing/2014/main" val="3774866187"/>
+                    <a16:rowId xmlns:a16="http://schemas.microsoft.com/office/drawing/2014/main" xmlns="" val="3774866187"/>
                   </a:ext>
                 </a:extLst>
               </a:tr>
@@ -6425,7 +5087,7 @@
                 </a:tc>
                 <a:extLst>
                   <a:ext uri="{0D108BD9-81ED-4DB2-BD59-A6C34878D82A}">
-                    <a16:rowId xmlns:a16="http://schemas.microsoft.com/office/drawing/2014/main" val="3748588297"/>
+                    <a16:rowId xmlns:a16="http://schemas.microsoft.com/office/drawing/2014/main" xmlns="" val="3748588297"/>
                   </a:ext>
                 </a:extLst>
               </a:tr>
@@ -6752,7 +5414,7 @@
                 </a:tc>
                 <a:extLst>
                   <a:ext uri="{0D108BD9-81ED-4DB2-BD59-A6C34878D82A}">
-                    <a16:rowId xmlns:a16="http://schemas.microsoft.com/office/drawing/2014/main" val="2632785171"/>
+                    <a16:rowId xmlns:a16="http://schemas.microsoft.com/office/drawing/2014/main" xmlns="" val="2632785171"/>
                   </a:ext>
                 </a:extLst>
               </a:tr>
@@ -7079,7 +5741,7 @@
                 </a:tc>
                 <a:extLst>
                   <a:ext uri="{0D108BD9-81ED-4DB2-BD59-A6C34878D82A}">
-                    <a16:rowId xmlns:a16="http://schemas.microsoft.com/office/drawing/2014/main" val="2276687584"/>
+                    <a16:rowId xmlns:a16="http://schemas.microsoft.com/office/drawing/2014/main" xmlns="" val="2276687584"/>
                   </a:ext>
                 </a:extLst>
               </a:tr>
@@ -7406,7 +6068,7 @@
                 </a:tc>
                 <a:extLst>
                   <a:ext uri="{0D108BD9-81ED-4DB2-BD59-A6C34878D82A}">
-                    <a16:rowId xmlns:a16="http://schemas.microsoft.com/office/drawing/2014/main" val="1940697069"/>
+                    <a16:rowId xmlns:a16="http://schemas.microsoft.com/office/drawing/2014/main" xmlns="" val="1940697069"/>
                   </a:ext>
                 </a:extLst>
               </a:tr>
@@ -7733,7 +6395,7 @@
                 </a:tc>
                 <a:extLst>
                   <a:ext uri="{0D108BD9-81ED-4DB2-BD59-A6C34878D82A}">
-                    <a16:rowId xmlns:a16="http://schemas.microsoft.com/office/drawing/2014/main" val="1814290460"/>
+                    <a16:rowId xmlns:a16="http://schemas.microsoft.com/office/drawing/2014/main" xmlns="" val="1814290460"/>
                   </a:ext>
                 </a:extLst>
               </a:tr>
@@ -8060,7 +6722,7 @@
                 </a:tc>
                 <a:extLst>
                   <a:ext uri="{0D108BD9-81ED-4DB2-BD59-A6C34878D82A}">
-                    <a16:rowId xmlns:a16="http://schemas.microsoft.com/office/drawing/2014/main" val="1921857588"/>
+                    <a16:rowId xmlns:a16="http://schemas.microsoft.com/office/drawing/2014/main" xmlns="" val="1921857588"/>
                   </a:ext>
                 </a:extLst>
               </a:tr>
@@ -8127,6 +6789,9 @@
                       <a:headEnd type="none" w="med" len="med"/>
                       <a:tailEnd type="none" w="med" len="med"/>
                     </a:lnB>
+                    <a:solidFill>
+                      <a:srgbClr val="FFFFFF"/>
+                    </a:solidFill>
                   </a:tcPr>
                 </a:tc>
                 <a:tc>
@@ -8191,6 +6856,9 @@
                       <a:headEnd type="none" w="med" len="med"/>
                       <a:tailEnd type="none" w="med" len="med"/>
                     </a:lnB>
+                    <a:solidFill>
+                      <a:srgbClr val="FFFFFF"/>
+                    </a:solidFill>
                   </a:tcPr>
                 </a:tc>
                 <a:tc>
@@ -8255,6 +6923,9 @@
                       <a:headEnd type="none" w="med" len="med"/>
                       <a:tailEnd type="none" w="med" len="med"/>
                     </a:lnB>
+                    <a:solidFill>
+                      <a:srgbClr val="FFFFFF"/>
+                    </a:solidFill>
                   </a:tcPr>
                 </a:tc>
                 <a:tc>
@@ -8319,6 +6990,9 @@
                       <a:headEnd type="none" w="med" len="med"/>
                       <a:tailEnd type="none" w="med" len="med"/>
                     </a:lnB>
+                    <a:solidFill>
+                      <a:srgbClr val="FFFFFF"/>
+                    </a:solidFill>
                   </a:tcPr>
                 </a:tc>
                 <a:tc>
@@ -8383,11 +7057,14 @@
                       <a:headEnd type="none" w="med" len="med"/>
                       <a:tailEnd type="none" w="med" len="med"/>
                     </a:lnB>
+                    <a:solidFill>
+                      <a:srgbClr val="FFFFFF"/>
+                    </a:solidFill>
                   </a:tcPr>
                 </a:tc>
                 <a:extLst>
                   <a:ext uri="{0D108BD9-81ED-4DB2-BD59-A6C34878D82A}">
-                    <a16:rowId xmlns:a16="http://schemas.microsoft.com/office/drawing/2014/main" val="2102998265"/>
+                    <a16:rowId xmlns:a16="http://schemas.microsoft.com/office/drawing/2014/main" xmlns="" val="2102998265"/>
                   </a:ext>
                 </a:extLst>
               </a:tr>
@@ -8454,6 +7131,9 @@
                       <a:headEnd type="none" w="med" len="med"/>
                       <a:tailEnd type="none" w="med" len="med"/>
                     </a:lnB>
+                    <a:solidFill>
+                      <a:srgbClr val="FFFFFF"/>
+                    </a:solidFill>
                   </a:tcPr>
                 </a:tc>
                 <a:tc>
@@ -8518,6 +7198,9 @@
                       <a:headEnd type="none" w="med" len="med"/>
                       <a:tailEnd type="none" w="med" len="med"/>
                     </a:lnB>
+                    <a:solidFill>
+                      <a:srgbClr val="FFFFFF"/>
+                    </a:solidFill>
                   </a:tcPr>
                 </a:tc>
                 <a:tc>
@@ -8582,6 +7265,9 @@
                       <a:headEnd type="none" w="med" len="med"/>
                       <a:tailEnd type="none" w="med" len="med"/>
                     </a:lnB>
+                    <a:solidFill>
+                      <a:srgbClr val="FFFFFF"/>
+                    </a:solidFill>
                   </a:tcPr>
                 </a:tc>
                 <a:tc>
@@ -8646,6 +7332,9 @@
                       <a:headEnd type="none" w="med" len="med"/>
                       <a:tailEnd type="none" w="med" len="med"/>
                     </a:lnB>
+                    <a:solidFill>
+                      <a:srgbClr val="FFFFFF"/>
+                    </a:solidFill>
                   </a:tcPr>
                 </a:tc>
                 <a:tc>
@@ -8710,11 +7399,14 @@
                       <a:headEnd type="none" w="med" len="med"/>
                       <a:tailEnd type="none" w="med" len="med"/>
                     </a:lnB>
+                    <a:solidFill>
+                      <a:srgbClr val="FFFFFF"/>
+                    </a:solidFill>
                   </a:tcPr>
                 </a:tc>
                 <a:extLst>
                   <a:ext uri="{0D108BD9-81ED-4DB2-BD59-A6C34878D82A}">
-                    <a16:rowId xmlns:a16="http://schemas.microsoft.com/office/drawing/2014/main" val="2312606863"/>
+                    <a16:rowId xmlns:a16="http://schemas.microsoft.com/office/drawing/2014/main" xmlns="" val="2312606863"/>
                   </a:ext>
                 </a:extLst>
               </a:tr>
@@ -8969,10 +7661,24 @@
           <a:p>
             <a:pPr algn="l"/>
             <a:r>
-              <a:rPr lang="en-US" altLang="ko-KR" sz="5400" dirty="0" smtClean="0"/>
+              <a:rPr lang="en-US" altLang="ko-KR" dirty="0" smtClean="0">
+                <a:solidFill>
+                  <a:schemeClr val="bg1">
+                    <a:lumMod val="75000"/>
+                    <a:lumOff val="25000"/>
+                  </a:schemeClr>
+                </a:solidFill>
+              </a:rPr>
               <a:t>Results</a:t>
             </a:r>
-            <a:endParaRPr lang="ko-KR" altLang="en-US" sz="5400" dirty="0"/>
+            <a:endParaRPr lang="ko-KR" altLang="en-US" dirty="0">
+              <a:solidFill>
+                <a:schemeClr val="bg1">
+                  <a:lumMod val="75000"/>
+                  <a:lumOff val="25000"/>
+                </a:schemeClr>
+              </a:solidFill>
+            </a:endParaRPr>
           </a:p>
         </p:txBody>
       </p:sp>
@@ -9056,7 +7762,7 @@
                       <m:fPr>
                         <m:ctrlPr>
                           <a:rPr lang="en-US" altLang="ko-KR" sz="3200" b="0" i="1" smtClean="0">
-                            <a:latin typeface="Cambria Math" panose="02040503050406030204" pitchFamily="18" charset="0"/>
+                            <a:latin typeface="Cambria Math" charset="0"/>
                           </a:rPr>
                         </m:ctrlPr>
                       </m:fPr>
@@ -9068,7 +7774,7 @@
                             <m:supHide m:val="on"/>
                             <m:ctrlPr>
                               <a:rPr lang="en-US" altLang="ko-KR" sz="3200" i="1">
-                                <a:latin typeface="Cambria Math" panose="02040503050406030204" pitchFamily="18" charset="0"/>
+                                <a:latin typeface="Cambria Math" charset="0"/>
                               </a:rPr>
                             </m:ctrlPr>
                           </m:naryPr>
@@ -9108,7 +7814,7 @@
                             <m:supHide m:val="on"/>
                             <m:ctrlPr>
                               <a:rPr lang="en-US" altLang="ko-KR" sz="3200" i="1">
-                                <a:latin typeface="Cambria Math" panose="02040503050406030204" pitchFamily="18" charset="0"/>
+                                <a:latin typeface="Cambria Math" charset="0"/>
                               </a:rPr>
                             </m:ctrlPr>
                           </m:naryPr>
@@ -9144,7 +7850,7 @@
                             <m:supHide m:val="on"/>
                             <m:ctrlPr>
                               <a:rPr lang="en-US" altLang="ko-KR" sz="3200" i="1">
-                                <a:latin typeface="Cambria Math" panose="02040503050406030204" pitchFamily="18" charset="0"/>
+                                <a:latin typeface="Cambria Math" charset="0"/>
                               </a:rPr>
                             </m:ctrlPr>
                           </m:naryPr>
@@ -9188,7 +7894,7 @@
                       <m:fPr>
                         <m:ctrlPr>
                           <a:rPr lang="pt-BR" altLang="ko-KR" sz="3200" b="1" i="1" smtClean="0">
-                            <a:latin typeface="Cambria Math" panose="02040503050406030204" pitchFamily="18" charset="0"/>
+                            <a:latin typeface="Cambria Math" charset="0"/>
                           </a:rPr>
                         </m:ctrlPr>
                       </m:fPr>
@@ -9283,10 +7989,24 @@
           <a:p>
             <a:pPr algn="l"/>
             <a:r>
-              <a:rPr lang="en-US" altLang="ko-KR" sz="5400" dirty="0" smtClean="0"/>
+              <a:rPr lang="en-US" altLang="ko-KR" dirty="0" smtClean="0">
+                <a:solidFill>
+                  <a:schemeClr val="bg1">
+                    <a:lumMod val="75000"/>
+                    <a:lumOff val="25000"/>
+                  </a:schemeClr>
+                </a:solidFill>
+              </a:rPr>
               <a:t>Results</a:t>
             </a:r>
-            <a:endParaRPr lang="ko-KR" altLang="en-US" sz="5400" dirty="0"/>
+            <a:endParaRPr lang="ko-KR" altLang="en-US" dirty="0">
+              <a:solidFill>
+                <a:schemeClr val="bg1">
+                  <a:lumMod val="75000"/>
+                  <a:lumOff val="25000"/>
+                </a:schemeClr>
+              </a:solidFill>
+            </a:endParaRPr>
           </a:p>
         </p:txBody>
       </p:sp>
@@ -9318,21 +8038,21 @@
                 <a:gridCol w="3362749">
                   <a:extLst>
                     <a:ext uri="{9D8B030D-6E8A-4147-A177-3AD203B41FA5}">
-                      <a16:colId xmlns:a16="http://schemas.microsoft.com/office/drawing/2014/main" val="3753976267"/>
+                      <a16:colId xmlns:a16="http://schemas.microsoft.com/office/drawing/2014/main" xmlns="" val="3753976267"/>
                     </a:ext>
                   </a:extLst>
                 </a:gridCol>
                 <a:gridCol w="3362749">
                   <a:extLst>
                     <a:ext uri="{9D8B030D-6E8A-4147-A177-3AD203B41FA5}">
-                      <a16:colId xmlns:a16="http://schemas.microsoft.com/office/drawing/2014/main" val="555406816"/>
+                      <a16:colId xmlns:a16="http://schemas.microsoft.com/office/drawing/2014/main" xmlns="" val="555406816"/>
                     </a:ext>
                   </a:extLst>
                 </a:gridCol>
                 <a:gridCol w="3362749">
                   <a:extLst>
                     <a:ext uri="{9D8B030D-6E8A-4147-A177-3AD203B41FA5}">
-                      <a16:colId xmlns:a16="http://schemas.microsoft.com/office/drawing/2014/main" val="909609356"/>
+                      <a16:colId xmlns:a16="http://schemas.microsoft.com/office/drawing/2014/main" xmlns="" val="909609356"/>
                     </a:ext>
                   </a:extLst>
                 </a:gridCol>
@@ -9545,7 +8265,7 @@
                 </a:tc>
                 <a:extLst>
                   <a:ext uri="{0D108BD9-81ED-4DB2-BD59-A6C34878D82A}">
-                    <a16:rowId xmlns:a16="http://schemas.microsoft.com/office/drawing/2014/main" val="44647431"/>
+                    <a16:rowId xmlns:a16="http://schemas.microsoft.com/office/drawing/2014/main" xmlns="" val="44647431"/>
                   </a:ext>
                 </a:extLst>
               </a:tr>
@@ -9798,7 +8518,7 @@
                 </a:tc>
                 <a:extLst>
                   <a:ext uri="{0D108BD9-81ED-4DB2-BD59-A6C34878D82A}">
-                    <a16:rowId xmlns:a16="http://schemas.microsoft.com/office/drawing/2014/main" val="3206173818"/>
+                    <a16:rowId xmlns:a16="http://schemas.microsoft.com/office/drawing/2014/main" xmlns="" val="3206173818"/>
                   </a:ext>
                 </a:extLst>
               </a:tr>
@@ -10051,7 +8771,7 @@
                 </a:tc>
                 <a:extLst>
                   <a:ext uri="{0D108BD9-81ED-4DB2-BD59-A6C34878D82A}">
-                    <a16:rowId xmlns:a16="http://schemas.microsoft.com/office/drawing/2014/main" val="286489483"/>
+                    <a16:rowId xmlns:a16="http://schemas.microsoft.com/office/drawing/2014/main" xmlns="" val="286489483"/>
                   </a:ext>
                 </a:extLst>
               </a:tr>
@@ -10097,8 +8817,8 @@
           <a:chExt cx="0" cy="0"/>
         </a:xfrm>
       </p:grpSpPr>
-      <mc:AlternateContent xmlns:mc="http://schemas.openxmlformats.org/markup-compatibility/2006">
-        <mc:Choice xmlns:a14="http://schemas.microsoft.com/office/drawing/2010/main" Requires="a14">
+      <mc:AlternateContent xmlns:mc="http://schemas.openxmlformats.org/markup-compatibility/2006" xmlns:a14="http://schemas.microsoft.com/office/drawing/2010/main">
+        <mc:Choice Requires="a14">
           <p:sp>
             <p:nvSpPr>
               <p:cNvPr id="3" name="텍스트 개체 틀 2"/>
@@ -10125,11 +8845,7 @@
                 </a:pPr>
                 <a:r>
                   <a:rPr lang="ko-KR" altLang="en-US" sz="2800" b="1" dirty="0" smtClean="0"/>
-                  <a:t>정확도 개선을 위한 단어 </a:t>
-                </a:r>
-                <a:r>
-                  <a:rPr lang="ko-KR" altLang="en-US" sz="2800" b="1" dirty="0" smtClean="0"/>
-                  <a:t>추천</a:t>
+                  <a:t>정확도 개선을 위한 단어 추천</a:t>
                 </a:r>
                 <a:endParaRPr lang="en-US" altLang="ko-KR" sz="2800" b="1" dirty="0" smtClean="0"/>
               </a:p>
@@ -10163,17 +8879,8 @@
                 </a:pPr>
                 <a:r>
                   <a:rPr lang="en-US" altLang="ko-KR" sz="2800" b="1" dirty="0" smtClean="0"/>
-                  <a:t>Accuracy </a:t>
+                  <a:t>Accuracy : 98.28%</a:t>
                 </a:r>
-                <a:r>
-                  <a:rPr lang="en-US" altLang="ko-KR" sz="2800" b="1" dirty="0" smtClean="0"/>
-                  <a:t>: </a:t>
-                </a:r>
-                <a:r>
-                  <a:rPr lang="en-US" altLang="ko-KR" sz="2800" b="1" dirty="0" smtClean="0"/>
-                  <a:t>98.28%</a:t>
-                </a:r>
-                <a:endParaRPr lang="en-US" altLang="ko-KR" sz="2800" b="1" dirty="0" smtClean="0"/>
               </a:p>
               <a:p>
                 <a:pPr marL="867833" lvl="1" indent="-342900">
@@ -10186,7 +8893,7 @@
                       <m:fPr>
                         <m:ctrlPr>
                           <a:rPr lang="en-US" altLang="ko-KR" sz="3200" b="0" i="1" smtClean="0">
-                            <a:latin typeface="Cambria Math" panose="02040503050406030204" pitchFamily="18" charset="0"/>
+                            <a:latin typeface="Cambria Math" charset="0"/>
                           </a:rPr>
                         </m:ctrlPr>
                       </m:fPr>
@@ -10198,7 +8905,7 @@
                             <m:supHide m:val="on"/>
                             <m:ctrlPr>
                               <a:rPr lang="en-US" altLang="ko-KR" sz="3200" i="1">
-                                <a:latin typeface="Cambria Math" panose="02040503050406030204" pitchFamily="18" charset="0"/>
+                                <a:latin typeface="Cambria Math" charset="0"/>
                               </a:rPr>
                             </m:ctrlPr>
                           </m:naryPr>
@@ -10238,7 +8945,7 @@
                             <m:supHide m:val="on"/>
                             <m:ctrlPr>
                               <a:rPr lang="en-US" altLang="ko-KR" sz="3200" i="1">
-                                <a:latin typeface="Cambria Math" panose="02040503050406030204" pitchFamily="18" charset="0"/>
+                                <a:latin typeface="Cambria Math" charset="0"/>
                               </a:rPr>
                             </m:ctrlPr>
                           </m:naryPr>
@@ -10274,7 +8981,7 @@
                             <m:supHide m:val="on"/>
                             <m:ctrlPr>
                               <a:rPr lang="en-US" altLang="ko-KR" sz="3200" i="1">
-                                <a:latin typeface="Cambria Math" panose="02040503050406030204" pitchFamily="18" charset="0"/>
+                                <a:latin typeface="Cambria Math" charset="0"/>
                               </a:rPr>
                             </m:ctrlPr>
                           </m:naryPr>
@@ -10318,7 +9025,7 @@
                       <m:fPr>
                         <m:ctrlPr>
                           <a:rPr lang="pt-BR" altLang="ko-KR" sz="3200" b="1" i="1" smtClean="0">
-                            <a:latin typeface="Cambria Math" panose="02040503050406030204" pitchFamily="18" charset="0"/>
+                            <a:latin typeface="Cambria Math" charset="0"/>
                           </a:rPr>
                         </m:ctrlPr>
                       </m:fPr>
@@ -10327,13 +9034,7 @@
                           <a:rPr lang="en-US" altLang="ko-KR" sz="3200" b="1" i="1" smtClean="0">
                             <a:latin typeface="Cambria Math" panose="02040503050406030204" pitchFamily="18" charset="0"/>
                           </a:rPr>
-                          <m:t>𝟑</m:t>
-                        </m:r>
-                        <m:r>
-                          <a:rPr lang="en-US" altLang="ko-KR" sz="3200" b="1" i="1" smtClean="0">
-                            <a:latin typeface="Cambria Math" panose="02040503050406030204" pitchFamily="18" charset="0"/>
-                          </a:rPr>
-                          <m:t>𝟑</m:t>
+                          <m:t>𝟑𝟑</m:t>
                         </m:r>
                         <m:r>
                           <a:rPr lang="en-US" altLang="ko-KR" sz="3200" b="1" i="1" smtClean="0">
@@ -10345,13 +9046,7 @@
                           <a:rPr lang="en-US" altLang="ko-KR" sz="3200" b="1" i="1" smtClean="0">
                             <a:latin typeface="Cambria Math" panose="02040503050406030204" pitchFamily="18" charset="0"/>
                           </a:rPr>
-                          <m:t>𝟑𝟏</m:t>
-                        </m:r>
-                        <m:r>
-                          <a:rPr lang="en-US" altLang="ko-KR" sz="3200" b="1" i="1" smtClean="0">
-                            <a:latin typeface="Cambria Math" panose="02040503050406030204" pitchFamily="18" charset="0"/>
-                          </a:rPr>
-                          <m:t>𝟎</m:t>
+                          <m:t>𝟑𝟏𝟎</m:t>
                         </m:r>
                       </m:num>
                       <m:den>
@@ -10370,7 +9065,7 @@
             </p:txBody>
           </p:sp>
         </mc:Choice>
-        <mc:Fallback>
+        <mc:Fallback xmlns="">
           <p:sp>
             <p:nvSpPr>
               <p:cNvPr id="3" name="텍스트 개체 틀 2"/>
@@ -10425,10 +9120,24 @@
           <a:p>
             <a:pPr algn="l"/>
             <a:r>
-              <a:rPr lang="en-US" altLang="ko-KR" sz="5400" dirty="0" smtClean="0"/>
+              <a:rPr lang="en-US" altLang="ko-KR" dirty="0" smtClean="0">
+                <a:solidFill>
+                  <a:schemeClr val="bg1">
+                    <a:lumMod val="75000"/>
+                    <a:lumOff val="25000"/>
+                  </a:schemeClr>
+                </a:solidFill>
+              </a:rPr>
               <a:t>Results</a:t>
             </a:r>
-            <a:endParaRPr lang="ko-KR" altLang="en-US" sz="5400" dirty="0"/>
+            <a:endParaRPr lang="ko-KR" altLang="en-US" dirty="0">
+              <a:solidFill>
+                <a:schemeClr val="bg1">
+                  <a:lumMod val="75000"/>
+                  <a:lumOff val="25000"/>
+                </a:schemeClr>
+              </a:solidFill>
+            </a:endParaRPr>
           </a:p>
         </p:txBody>
       </p:sp>
@@ -10460,21 +9169,21 @@
                 <a:gridCol w="3362749">
                   <a:extLst>
                     <a:ext uri="{9D8B030D-6E8A-4147-A177-3AD203B41FA5}">
-                      <a16:colId xmlns:a16="http://schemas.microsoft.com/office/drawing/2014/main" val="3753976267"/>
+                      <a16:colId xmlns:a16="http://schemas.microsoft.com/office/drawing/2014/main" xmlns="" val="3753976267"/>
                     </a:ext>
                   </a:extLst>
                 </a:gridCol>
                 <a:gridCol w="3362749">
                   <a:extLst>
                     <a:ext uri="{9D8B030D-6E8A-4147-A177-3AD203B41FA5}">
-                      <a16:colId xmlns:a16="http://schemas.microsoft.com/office/drawing/2014/main" val="555406816"/>
+                      <a16:colId xmlns:a16="http://schemas.microsoft.com/office/drawing/2014/main" xmlns="" val="555406816"/>
                     </a:ext>
                   </a:extLst>
                 </a:gridCol>
                 <a:gridCol w="3362749">
                   <a:extLst>
                     <a:ext uri="{9D8B030D-6E8A-4147-A177-3AD203B41FA5}">
-                      <a16:colId xmlns:a16="http://schemas.microsoft.com/office/drawing/2014/main" val="909609356"/>
+                      <a16:colId xmlns:a16="http://schemas.microsoft.com/office/drawing/2014/main" xmlns="" val="909609356"/>
                     </a:ext>
                   </a:extLst>
                 </a:gridCol>
@@ -10687,7 +9396,7 @@
                 </a:tc>
                 <a:extLst>
                   <a:ext uri="{0D108BD9-81ED-4DB2-BD59-A6C34878D82A}">
-                    <a16:rowId xmlns:a16="http://schemas.microsoft.com/office/drawing/2014/main" val="44647431"/>
+                    <a16:rowId xmlns:a16="http://schemas.microsoft.com/office/drawing/2014/main" xmlns="" val="44647431"/>
                   </a:ext>
                 </a:extLst>
               </a:tr>
@@ -10940,7 +9649,7 @@
                 </a:tc>
                 <a:extLst>
                   <a:ext uri="{0D108BD9-81ED-4DB2-BD59-A6C34878D82A}">
-                    <a16:rowId xmlns:a16="http://schemas.microsoft.com/office/drawing/2014/main" val="3206173818"/>
+                    <a16:rowId xmlns:a16="http://schemas.microsoft.com/office/drawing/2014/main" xmlns="" val="3206173818"/>
                   </a:ext>
                 </a:extLst>
               </a:tr>
@@ -11193,7 +9902,7 @@
                 </a:tc>
                 <a:extLst>
                   <a:ext uri="{0D108BD9-81ED-4DB2-BD59-A6C34878D82A}">
-                    <a16:rowId xmlns:a16="http://schemas.microsoft.com/office/drawing/2014/main" val="286489483"/>
+                    <a16:rowId xmlns:a16="http://schemas.microsoft.com/office/drawing/2014/main" xmlns="" val="286489483"/>
                   </a:ext>
                 </a:extLst>
               </a:tr>
@@ -11205,6 +9914,186 @@
     <p:extLst>
       <p:ext uri="{BB962C8B-B14F-4D97-AF65-F5344CB8AC3E}">
         <p14:creationId xmlns:p14="http://schemas.microsoft.com/office/powerpoint/2010/main" val="3878125959"/>
+      </p:ext>
+    </p:extLst>
+  </p:cSld>
+  <p:clrMapOvr>
+    <a:masterClrMapping/>
+  </p:clrMapOvr>
+  <p:transition spd="med"/>
+  <p:timing>
+    <p:tnLst>
+      <p:par>
+        <p:cTn id="1" dur="indefinite" restart="never" nodeType="tmRoot"/>
+      </p:par>
+    </p:tnLst>
+  </p:timing>
+</p:sld>
+</file>
+
+<file path=ppt/slides/slide9.xml><?xml version="1.0" encoding="utf-8"?>
+<p:sld xmlns:a="http://schemas.openxmlformats.org/drawingml/2006/main" xmlns:r="http://schemas.openxmlformats.org/officeDocument/2006/relationships" xmlns:p="http://schemas.openxmlformats.org/presentationml/2006/main">
+  <p:cSld>
+    <p:spTree>
+      <p:nvGrpSpPr>
+        <p:cNvPr id="1" name=""/>
+        <p:cNvGrpSpPr/>
+        <p:nvPr/>
+      </p:nvGrpSpPr>
+      <p:grpSpPr>
+        <a:xfrm>
+          <a:off x="0" y="0"/>
+          <a:ext cx="0" cy="0"/>
+          <a:chOff x="0" y="0"/>
+          <a:chExt cx="0" cy="0"/>
+        </a:xfrm>
+      </p:grpSpPr>
+      <p:sp>
+        <p:nvSpPr>
+          <p:cNvPr id="3" name="텍스트 개체 틀 2"/>
+          <p:cNvSpPr>
+            <a:spLocks noGrp="1"/>
+          </p:cNvSpPr>
+          <p:nvPr>
+            <p:ph type="body" idx="1"/>
+          </p:nvPr>
+        </p:nvSpPr>
+        <p:spPr>
+          <a:xfrm>
+            <a:off x="1079500" y="2043206"/>
+            <a:ext cx="10845800" cy="7062374"/>
+          </a:xfrm>
+        </p:spPr>
+        <p:txBody>
+          <a:bodyPr anchor="t"/>
+          <a:lstStyle/>
+          <a:p>
+            <a:pPr marL="560388" indent="-560388">
+              <a:buFont typeface="Wingdings" panose="05000000000000000000" pitchFamily="2" charset="2"/>
+              <a:buChar char="v"/>
+            </a:pPr>
+            <a:r>
+              <a:rPr lang="en-US" sz="2400"/>
+              <a:t>Support Vector Machine</a:t>
+            </a:r>
+          </a:p>
+          <a:p>
+            <a:pPr marL="560388" indent="-560388">
+              <a:buFont typeface="Wingdings" panose="05000000000000000000" pitchFamily="2" charset="2"/>
+              <a:buChar char="v"/>
+            </a:pPr>
+            <a:r>
+              <a:rPr lang="en-US" altLang="ko-KR" sz="2400"/>
+              <a:t>2-class classifier </a:t>
+            </a:r>
+            <a:r>
+              <a:rPr lang="ko-KR" altLang="en-US" sz="2400"/>
+              <a:t>중에서 일반화 능력이 좋다고 알려</a:t>
+            </a:r>
+            <a:r>
+              <a:rPr lang="ko-KR" altLang="en-US" sz="2400"/>
+              <a:t>짐</a:t>
+            </a:r>
+          </a:p>
+          <a:p>
+            <a:pPr marL="560388" indent="-560388">
+              <a:buFont typeface="Wingdings" panose="05000000000000000000" pitchFamily="2" charset="2"/>
+              <a:buChar char="v"/>
+            </a:pPr>
+            <a:r>
+              <a:rPr lang="en-US" altLang="ko-KR" sz="2400"/>
+              <a:t>SVM </a:t>
+            </a:r>
+            <a:r>
+              <a:rPr lang="ko-KR" altLang="en-US" sz="2400"/>
+              <a:t>의 역할</a:t>
+            </a:r>
+            <a:r>
+              <a:rPr lang="en-US" altLang="ko-KR" sz="2400"/>
+              <a:t>:</a:t>
+            </a:r>
+            <a:r>
+              <a:rPr lang="ko-KR" altLang="en-US" sz="2400"/>
+              <a:t> 이 </a:t>
+            </a:r>
+            <a:r>
+              <a:rPr lang="en-US" altLang="ko-KR" sz="2400"/>
+              <a:t>Margin</a:t>
+            </a:r>
+            <a:r>
+              <a:rPr lang="ko-KR" altLang="en-US" sz="2400"/>
+              <a:t>을 최대로 하는 결정직선을 찾는것</a:t>
+            </a:r>
+            <a:endParaRPr lang="en-US" altLang="ko-KR" sz="2400" b="1" dirty="0" smtClean="0"/>
+          </a:p>
+        </p:txBody>
+      </p:sp>
+      <p:sp>
+        <p:nvSpPr>
+          <p:cNvPr id="2" name="제목 1"/>
+          <p:cNvSpPr>
+            <a:spLocks noGrp="1"/>
+          </p:cNvSpPr>
+          <p:nvPr>
+            <p:ph type="title"/>
+          </p:nvPr>
+        </p:nvSpPr>
+        <p:spPr/>
+        <p:txBody>
+          <a:bodyPr/>
+          <a:lstStyle/>
+          <a:p>
+            <a:pPr algn="l"/>
+            <a:r>
+              <a:rPr lang="en-US" altLang="ko-KR" dirty="0" smtClean="0">
+                <a:solidFill>
+                  <a:schemeClr val="bg1">
+                    <a:lumMod val="75000"/>
+                    <a:lumOff val="25000"/>
+                  </a:schemeClr>
+                </a:solidFill>
+              </a:rPr>
+              <a:t>SVM</a:t>
+            </a:r>
+            <a:endParaRPr lang="ko-KR" altLang="en-US" dirty="0">
+              <a:solidFill>
+                <a:schemeClr val="bg1">
+                  <a:lumMod val="75000"/>
+                  <a:lumOff val="25000"/>
+                </a:schemeClr>
+              </a:solidFill>
+            </a:endParaRPr>
+          </a:p>
+        </p:txBody>
+      </p:sp>
+      <p:pic>
+        <p:nvPicPr>
+          <p:cNvPr id="6" name="Picture 5"/>
+          <p:cNvPicPr>
+            <a:picLocks noChangeAspect="1"/>
+          </p:cNvPicPr>
+          <p:nvPr/>
+        </p:nvPicPr>
+        <p:blipFill>
+          <a:blip r:embed="rId2"/>
+          <a:stretch>
+            <a:fillRect/>
+          </a:stretch>
+        </p:blipFill>
+        <p:spPr>
+          <a:xfrm>
+            <a:off x="2507650" y="4717774"/>
+            <a:ext cx="5744037" cy="4387806"/>
+          </a:xfrm>
+          <a:prstGeom prst="rect">
+            <a:avLst/>
+          </a:prstGeom>
+        </p:spPr>
+      </p:pic>
+    </p:spTree>
+    <p:extLst>
+      <p:ext uri="{BB962C8B-B14F-4D97-AF65-F5344CB8AC3E}">
+        <p14:creationId xmlns:p14="http://schemas.microsoft.com/office/powerpoint/2010/main" val="327563938"/>
       </p:ext>
     </p:extLst>
   </p:cSld>

</xml_diff>